<commit_message>
added realtime control, updated some dictionary items and made a standalone simulation runner
</commit_message>
<xml_diff>
--- a/design_docs/tutorial-enhanced-control-deployment.pptx
+++ b/design_docs/tutorial-enhanced-control-deployment.pptx
@@ -287,7 +287,7 @@
           <a:p>
             <a:fld id="{A272420E-BA8F-4B7D-A9E7-4DE10E8B2218}" type="datetimeFigureOut">
               <a:rPr lang="en-US" smtClean="0"/>
-              <a:t>11/23/2020</a:t>
+              <a:t>12/1/2020</a:t>
             </a:fld>
             <a:endParaRPr lang="en-US"/>
           </a:p>
@@ -485,7 +485,7 @@
           <a:p>
             <a:fld id="{A272420E-BA8F-4B7D-A9E7-4DE10E8B2218}" type="datetimeFigureOut">
               <a:rPr lang="en-US" smtClean="0"/>
-              <a:t>11/23/2020</a:t>
+              <a:t>12/1/2020</a:t>
             </a:fld>
             <a:endParaRPr lang="en-US"/>
           </a:p>
@@ -693,7 +693,7 @@
           <a:p>
             <a:fld id="{A272420E-BA8F-4B7D-A9E7-4DE10E8B2218}" type="datetimeFigureOut">
               <a:rPr lang="en-US" smtClean="0"/>
-              <a:t>11/23/2020</a:t>
+              <a:t>12/1/2020</a:t>
             </a:fld>
             <a:endParaRPr lang="en-US"/>
           </a:p>
@@ -1222,7 +1222,7 @@
           <a:p>
             <a:fld id="{ABD4F8E3-4ED9-44B4-99E6-8A3D2CF8D415}" type="datetime4">
               <a:rPr lang="en-US" smtClean="0"/>
-              <a:t>November 23, 2020</a:t>
+              <a:t>December 1, 2020</a:t>
             </a:fld>
             <a:endParaRPr lang="en-US" dirty="0"/>
           </a:p>
@@ -1730,7 +1730,7 @@
             <a:fld id="{9B7EE7B1-A6C1-4E39-8665-A73ED03F32E1}" type="datetimeFigureOut">
               <a:rPr lang="en-US" smtClean="0"/>
               <a:pPr/>
-              <a:t>11/23/2020</a:t>
+              <a:t>12/1/2020</a:t>
             </a:fld>
             <a:endParaRPr lang="en-US" dirty="0"/>
           </a:p>
@@ -2155,7 +2155,7 @@
             <a:fld id="{9B7EE7B1-A6C1-4E39-8665-A73ED03F32E1}" type="datetimeFigureOut">
               <a:rPr lang="en-US" smtClean="0"/>
               <a:pPr/>
-              <a:t>11/23/2020</a:t>
+              <a:t>12/1/2020</a:t>
             </a:fld>
             <a:endParaRPr lang="en-US" dirty="0"/>
           </a:p>
@@ -2579,7 +2579,7 @@
             <a:fld id="{9B7EE7B1-A6C1-4E39-8665-A73ED03F32E1}" type="datetimeFigureOut">
               <a:rPr lang="en-US" smtClean="0"/>
               <a:pPr/>
-              <a:t>11/23/2020</a:t>
+              <a:t>12/1/2020</a:t>
             </a:fld>
             <a:endParaRPr lang="en-US" dirty="0"/>
           </a:p>
@@ -3504,7 +3504,7 @@
             <a:fld id="{9B7EE7B1-A6C1-4E39-8665-A73ED03F32E1}" type="datetimeFigureOut">
               <a:rPr lang="en-US" smtClean="0"/>
               <a:pPr/>
-              <a:t>11/23/2020</a:t>
+              <a:t>12/1/2020</a:t>
             </a:fld>
             <a:endParaRPr lang="en-US" dirty="0"/>
           </a:p>
@@ -4619,7 +4619,7 @@
             <a:fld id="{9B7EE7B1-A6C1-4E39-8665-A73ED03F32E1}" type="datetimeFigureOut">
               <a:rPr lang="en-US" smtClean="0"/>
               <a:pPr/>
-              <a:t>11/23/2020</a:t>
+              <a:t>12/1/2020</a:t>
             </a:fld>
             <a:endParaRPr lang="en-US" dirty="0"/>
           </a:p>
@@ -5767,7 +5767,7 @@
             <a:fld id="{9B7EE7B1-A6C1-4E39-8665-A73ED03F32E1}" type="datetimeFigureOut">
               <a:rPr lang="en-US" smtClean="0"/>
               <a:pPr/>
-              <a:t>11/23/2020</a:t>
+              <a:t>12/1/2020</a:t>
             </a:fld>
             <a:endParaRPr lang="en-US" dirty="0"/>
           </a:p>
@@ -6042,7 +6042,7 @@
             <a:fld id="{9B7EE7B1-A6C1-4E39-8665-A73ED03F32E1}" type="datetimeFigureOut">
               <a:rPr lang="en-US" smtClean="0"/>
               <a:pPr/>
-              <a:t>11/23/2020</a:t>
+              <a:t>12/1/2020</a:t>
             </a:fld>
             <a:endParaRPr lang="en-US" dirty="0"/>
           </a:p>
@@ -6241,7 +6241,7 @@
           <a:p>
             <a:fld id="{A272420E-BA8F-4B7D-A9E7-4DE10E8B2218}" type="datetimeFigureOut">
               <a:rPr lang="en-US" smtClean="0"/>
-              <a:t>11/23/2020</a:t>
+              <a:t>12/1/2020</a:t>
             </a:fld>
             <a:endParaRPr lang="en-US"/>
           </a:p>
@@ -6862,7 +6862,7 @@
           <a:p>
             <a:fld id="{A272420E-BA8F-4B7D-A9E7-4DE10E8B2218}" type="datetimeFigureOut">
               <a:rPr lang="en-US" smtClean="0"/>
-              <a:t>11/23/2020</a:t>
+              <a:t>12/1/2020</a:t>
             </a:fld>
             <a:endParaRPr lang="en-US"/>
           </a:p>
@@ -7127,7 +7127,7 @@
           <a:p>
             <a:fld id="{A272420E-BA8F-4B7D-A9E7-4DE10E8B2218}" type="datetimeFigureOut">
               <a:rPr lang="en-US" smtClean="0"/>
-              <a:t>11/23/2020</a:t>
+              <a:t>12/1/2020</a:t>
             </a:fld>
             <a:endParaRPr lang="en-US"/>
           </a:p>
@@ -7539,7 +7539,7 @@
           <a:p>
             <a:fld id="{A272420E-BA8F-4B7D-A9E7-4DE10E8B2218}" type="datetimeFigureOut">
               <a:rPr lang="en-US" smtClean="0"/>
-              <a:t>11/23/2020</a:t>
+              <a:t>12/1/2020</a:t>
             </a:fld>
             <a:endParaRPr lang="en-US"/>
           </a:p>
@@ -7680,7 +7680,7 @@
           <a:p>
             <a:fld id="{A272420E-BA8F-4B7D-A9E7-4DE10E8B2218}" type="datetimeFigureOut">
               <a:rPr lang="en-US" smtClean="0"/>
-              <a:t>11/23/2020</a:t>
+              <a:t>12/1/2020</a:t>
             </a:fld>
             <a:endParaRPr lang="en-US"/>
           </a:p>
@@ -7793,7 +7793,7 @@
           <a:p>
             <a:fld id="{A272420E-BA8F-4B7D-A9E7-4DE10E8B2218}" type="datetimeFigureOut">
               <a:rPr lang="en-US" smtClean="0"/>
-              <a:t>11/23/2020</a:t>
+              <a:t>12/1/2020</a:t>
             </a:fld>
             <a:endParaRPr lang="en-US"/>
           </a:p>
@@ -8104,7 +8104,7 @@
           <a:p>
             <a:fld id="{A272420E-BA8F-4B7D-A9E7-4DE10E8B2218}" type="datetimeFigureOut">
               <a:rPr lang="en-US" smtClean="0"/>
-              <a:t>11/23/2020</a:t>
+              <a:t>12/1/2020</a:t>
             </a:fld>
             <a:endParaRPr lang="en-US"/>
           </a:p>
@@ -8392,7 +8392,7 @@
           <a:p>
             <a:fld id="{A272420E-BA8F-4B7D-A9E7-4DE10E8B2218}" type="datetimeFigureOut">
               <a:rPr lang="en-US" smtClean="0"/>
-              <a:t>11/23/2020</a:t>
+              <a:t>12/1/2020</a:t>
             </a:fld>
             <a:endParaRPr lang="en-US"/>
           </a:p>
@@ -8633,7 +8633,7 @@
           <a:p>
             <a:fld id="{A272420E-BA8F-4B7D-A9E7-4DE10E8B2218}" type="datetimeFigureOut">
               <a:rPr lang="en-US" smtClean="0"/>
-              <a:t>11/23/2020</a:t>
+              <a:t>12/1/2020</a:t>
             </a:fld>
             <a:endParaRPr lang="en-US"/>
           </a:p>
@@ -16888,14 +16888,14 @@
           </a:ln>
           <a:extLst>
             <a:ext uri="{909E8E84-426E-40dd-AFC4-6F175D3DCCD1}">
-              <a14:hiddenFill xmlns:a14="http://schemas.microsoft.com/office/drawing/2010/main" xmlns="">
+              <a14:hiddenFill xmlns="" xmlns:a14="http://schemas.microsoft.com/office/drawing/2010/main">
                 <a:solidFill>
                   <a:srgbClr val="FFFFFF"/>
                 </a:solidFill>
               </a14:hiddenFill>
             </a:ext>
             <a:ext uri="{91240B29-F687-4f45-9708-019B960494DF}">
-              <a14:hiddenLine xmlns:a14="http://schemas.microsoft.com/office/drawing/2010/main" xmlns="" w="9525">
+              <a14:hiddenLine xmlns="" xmlns:a14="http://schemas.microsoft.com/office/drawing/2010/main" w="9525">
                 <a:solidFill>
                   <a:srgbClr val="000000"/>
                 </a:solidFill>
@@ -16905,7 +16905,7 @@
               </a14:hiddenLine>
             </a:ext>
             <a:ext uri="{FAA26D3D-D897-4be2-8F04-BA451C77F1D7}">
-              <ma14:placeholderFlag xmlns:ma14="http://schemas.microsoft.com/office/mac/drawingml/2011/main" xmlns="" val="1"/>
+              <ma14:placeholderFlag xmlns="" xmlns:ma14="http://schemas.microsoft.com/office/mac/drawingml/2011/main" val="1"/>
             </a:ext>
           </a:extLst>
         </p:spPr>
@@ -16966,14 +16966,14 @@
           </a:ln>
           <a:extLst>
             <a:ext uri="{909E8E84-426E-40dd-AFC4-6F175D3DCCD1}">
-              <a14:hiddenFill xmlns:a14="http://schemas.microsoft.com/office/drawing/2010/main" xmlns="">
+              <a14:hiddenFill xmlns="" xmlns:a14="http://schemas.microsoft.com/office/drawing/2010/main">
                 <a:solidFill>
                   <a:srgbClr val="FFFFFF"/>
                 </a:solidFill>
               </a14:hiddenFill>
             </a:ext>
             <a:ext uri="{91240B29-F687-4f45-9708-019B960494DF}">
-              <a14:hiddenLine xmlns:a14="http://schemas.microsoft.com/office/drawing/2010/main" xmlns="" w="9525">
+              <a14:hiddenLine xmlns="" xmlns:a14="http://schemas.microsoft.com/office/drawing/2010/main" w="9525">
                 <a:solidFill>
                   <a:srgbClr val="000000"/>
                 </a:solidFill>
@@ -16983,7 +16983,7 @@
               </a14:hiddenLine>
             </a:ext>
             <a:ext uri="{FAA26D3D-D897-4be2-8F04-BA451C77F1D7}">
-              <ma14:placeholderFlag xmlns:ma14="http://schemas.microsoft.com/office/mac/drawingml/2011/main" xmlns="" val="1"/>
+              <ma14:placeholderFlag xmlns="" xmlns:ma14="http://schemas.microsoft.com/office/mac/drawingml/2011/main" val="1"/>
             </a:ext>
           </a:extLst>
         </p:spPr>
@@ -17041,14 +17041,14 @@
           </a:ln>
           <a:extLst>
             <a:ext uri="{909E8E84-426E-40dd-AFC4-6F175D3DCCD1}">
-              <a14:hiddenFill xmlns:a14="http://schemas.microsoft.com/office/drawing/2010/main" xmlns="">
+              <a14:hiddenFill xmlns="" xmlns:a14="http://schemas.microsoft.com/office/drawing/2010/main">
                 <a:solidFill>
                   <a:srgbClr val="FFFFFF"/>
                 </a:solidFill>
               </a14:hiddenFill>
             </a:ext>
             <a:ext uri="{91240B29-F687-4f45-9708-019B960494DF}">
-              <a14:hiddenLine xmlns:a14="http://schemas.microsoft.com/office/drawing/2010/main" xmlns="" w="9525">
+              <a14:hiddenLine xmlns="" xmlns:a14="http://schemas.microsoft.com/office/drawing/2010/main" w="9525">
                 <a:solidFill>
                   <a:srgbClr val="000000"/>
                 </a:solidFill>
@@ -17058,7 +17058,7 @@
               </a14:hiddenLine>
             </a:ext>
             <a:ext uri="{FAA26D3D-D897-4be2-8F04-BA451C77F1D7}">
-              <ma14:placeholderFlag xmlns:ma14="http://schemas.microsoft.com/office/mac/drawingml/2011/main" xmlns="" val="1"/>
+              <ma14:placeholderFlag xmlns="" xmlns:ma14="http://schemas.microsoft.com/office/mac/drawingml/2011/main" val="1"/>
             </a:ext>
           </a:extLst>
         </p:spPr>
@@ -17862,14 +17862,14 @@
           </a:ln>
           <a:extLst>
             <a:ext uri="{909E8E84-426E-40dd-AFC4-6F175D3DCCD1}">
-              <a14:hiddenFill xmlns:a14="http://schemas.microsoft.com/office/drawing/2010/main" xmlns="">
+              <a14:hiddenFill xmlns="" xmlns:a14="http://schemas.microsoft.com/office/drawing/2010/main">
                 <a:solidFill>
                   <a:srgbClr val="FFFFFF"/>
                 </a:solidFill>
               </a14:hiddenFill>
             </a:ext>
             <a:ext uri="{91240B29-F687-4f45-9708-019B960494DF}">
-              <a14:hiddenLine xmlns:a14="http://schemas.microsoft.com/office/drawing/2010/main" xmlns="" w="9525">
+              <a14:hiddenLine xmlns="" xmlns:a14="http://schemas.microsoft.com/office/drawing/2010/main" w="9525">
                 <a:solidFill>
                   <a:srgbClr val="000000"/>
                 </a:solidFill>
@@ -17879,7 +17879,7 @@
               </a14:hiddenLine>
             </a:ext>
             <a:ext uri="{FAA26D3D-D897-4be2-8F04-BA451C77F1D7}">
-              <ma14:placeholderFlag xmlns:ma14="http://schemas.microsoft.com/office/mac/drawingml/2011/main" xmlns="" val="1"/>
+              <ma14:placeholderFlag xmlns="" xmlns:ma14="http://schemas.microsoft.com/office/mac/drawingml/2011/main" val="1"/>
             </a:ext>
           </a:extLst>
         </p:spPr>
@@ -17940,14 +17940,14 @@
           </a:ln>
           <a:extLst>
             <a:ext uri="{909E8E84-426E-40dd-AFC4-6F175D3DCCD1}">
-              <a14:hiddenFill xmlns:a14="http://schemas.microsoft.com/office/drawing/2010/main" xmlns="">
+              <a14:hiddenFill xmlns="" xmlns:a14="http://schemas.microsoft.com/office/drawing/2010/main">
                 <a:solidFill>
                   <a:srgbClr val="FFFFFF"/>
                 </a:solidFill>
               </a14:hiddenFill>
             </a:ext>
             <a:ext uri="{91240B29-F687-4f45-9708-019B960494DF}">
-              <a14:hiddenLine xmlns:a14="http://schemas.microsoft.com/office/drawing/2010/main" xmlns="" w="9525">
+              <a14:hiddenLine xmlns="" xmlns:a14="http://schemas.microsoft.com/office/drawing/2010/main" w="9525">
                 <a:solidFill>
                   <a:srgbClr val="000000"/>
                 </a:solidFill>
@@ -17957,7 +17957,7 @@
               </a14:hiddenLine>
             </a:ext>
             <a:ext uri="{FAA26D3D-D897-4be2-8F04-BA451C77F1D7}">
-              <ma14:placeholderFlag xmlns:ma14="http://schemas.microsoft.com/office/mac/drawingml/2011/main" xmlns="" val="1"/>
+              <ma14:placeholderFlag xmlns="" xmlns:ma14="http://schemas.microsoft.com/office/mac/drawingml/2011/main" val="1"/>
             </a:ext>
           </a:extLst>
         </p:spPr>
@@ -18556,16 +18556,19 @@
           <a:bodyPr/>
           <a:lstStyle/>
           <a:p>
-            <a:endParaRPr lang="en-US"/>
-          </a:p>
-        </p:txBody>
-      </p:sp>
-      <p:sp>
-        <p:nvSpPr>
-          <p:cNvPr id="5" name="Freeform: Shape 4">
-            <a:extLst>
-              <a:ext uri="{FF2B5EF4-FFF2-40B4-BE49-F238E27FC236}">
-                <a16:creationId xmlns:a16="http://schemas.microsoft.com/office/drawing/2014/main" id="{03BB72DF-B475-4941-9F39-F37DCA561242}"/>
+            <a:r>
+              <a:rPr lang="en-US" dirty="0"/>
+              <a:t>Plotting</a:t>
+            </a:r>
+          </a:p>
+        </p:txBody>
+      </p:sp>
+      <p:sp>
+        <p:nvSpPr>
+          <p:cNvPr id="7" name="Rectangle: Rounded Corners 6">
+            <a:extLst>
+              <a:ext uri="{FF2B5EF4-FFF2-40B4-BE49-F238E27FC236}">
+                <a16:creationId xmlns:a16="http://schemas.microsoft.com/office/drawing/2014/main" id="{E449594F-066B-40F6-B7E9-24E3088259BE}"/>
               </a:ext>
             </a:extLst>
           </p:cNvPr>
@@ -18574,187 +18577,24 @@
         </p:nvSpPr>
         <p:spPr>
           <a:xfrm>
-            <a:off x="4251008" y="2478469"/>
-            <a:ext cx="3838892" cy="1585531"/>
-          </a:xfrm>
-          <a:custGeom>
+            <a:off x="4983629" y="5339789"/>
+            <a:ext cx="2438400" cy="365797"/>
+          </a:xfrm>
+          <a:prstGeom prst="roundRect">
             <a:avLst/>
-            <a:gdLst>
-              <a:gd name="connsiteX0" fmla="*/ 0 w 2517059"/>
-              <a:gd name="connsiteY0" fmla="*/ 63521 h 541483"/>
-              <a:gd name="connsiteX1" fmla="*/ 147484 w 2517059"/>
-              <a:gd name="connsiteY1" fmla="*/ 161843 h 541483"/>
-              <a:gd name="connsiteX2" fmla="*/ 275304 w 2517059"/>
-              <a:gd name="connsiteY2" fmla="*/ 230669 h 541483"/>
-              <a:gd name="connsiteX3" fmla="*/ 442452 w 2517059"/>
-              <a:gd name="connsiteY3" fmla="*/ 211005 h 541483"/>
-              <a:gd name="connsiteX4" fmla="*/ 648930 w 2517059"/>
-              <a:gd name="connsiteY4" fmla="*/ 486308 h 541483"/>
-              <a:gd name="connsiteX5" fmla="*/ 875071 w 2517059"/>
-              <a:gd name="connsiteY5" fmla="*/ 515805 h 541483"/>
-              <a:gd name="connsiteX6" fmla="*/ 943897 w 2517059"/>
-              <a:gd name="connsiteY6" fmla="*/ 191340 h 541483"/>
-              <a:gd name="connsiteX7" fmla="*/ 1042220 w 2517059"/>
-              <a:gd name="connsiteY7" fmla="*/ 309327 h 541483"/>
-              <a:gd name="connsiteX8" fmla="*/ 1081549 w 2517059"/>
-              <a:gd name="connsiteY8" fmla="*/ 4527 h 541483"/>
-              <a:gd name="connsiteX9" fmla="*/ 1150375 w 2517059"/>
-              <a:gd name="connsiteY9" fmla="*/ 122514 h 541483"/>
-              <a:gd name="connsiteX10" fmla="*/ 1258530 w 2517059"/>
-              <a:gd name="connsiteY10" fmla="*/ 63521 h 541483"/>
-              <a:gd name="connsiteX11" fmla="*/ 1563330 w 2517059"/>
-              <a:gd name="connsiteY11" fmla="*/ 348656 h 541483"/>
-              <a:gd name="connsiteX12" fmla="*/ 1887794 w 2517059"/>
-              <a:gd name="connsiteY12" fmla="*/ 34024 h 541483"/>
-              <a:gd name="connsiteX13" fmla="*/ 2212259 w 2517059"/>
-              <a:gd name="connsiteY13" fmla="*/ 112682 h 541483"/>
-              <a:gd name="connsiteX14" fmla="*/ 2359742 w 2517059"/>
-              <a:gd name="connsiteY14" fmla="*/ 43856 h 541483"/>
-              <a:gd name="connsiteX15" fmla="*/ 2517059 w 2517059"/>
-              <a:gd name="connsiteY15" fmla="*/ 102850 h 541483"/>
-            </a:gdLst>
-            <a:ahLst/>
-            <a:cxnLst>
-              <a:cxn ang="0">
-                <a:pos x="connsiteX0" y="connsiteY0"/>
-              </a:cxn>
-              <a:cxn ang="0">
-                <a:pos x="connsiteX1" y="connsiteY1"/>
-              </a:cxn>
-              <a:cxn ang="0">
-                <a:pos x="connsiteX2" y="connsiteY2"/>
-              </a:cxn>
-              <a:cxn ang="0">
-                <a:pos x="connsiteX3" y="connsiteY3"/>
-              </a:cxn>
-              <a:cxn ang="0">
-                <a:pos x="connsiteX4" y="connsiteY4"/>
-              </a:cxn>
-              <a:cxn ang="0">
-                <a:pos x="connsiteX5" y="connsiteY5"/>
-              </a:cxn>
-              <a:cxn ang="0">
-                <a:pos x="connsiteX6" y="connsiteY6"/>
-              </a:cxn>
-              <a:cxn ang="0">
-                <a:pos x="connsiteX7" y="connsiteY7"/>
-              </a:cxn>
-              <a:cxn ang="0">
-                <a:pos x="connsiteX8" y="connsiteY8"/>
-              </a:cxn>
-              <a:cxn ang="0">
-                <a:pos x="connsiteX9" y="connsiteY9"/>
-              </a:cxn>
-              <a:cxn ang="0">
-                <a:pos x="connsiteX10" y="connsiteY10"/>
-              </a:cxn>
-              <a:cxn ang="0">
-                <a:pos x="connsiteX11" y="connsiteY11"/>
-              </a:cxn>
-              <a:cxn ang="0">
-                <a:pos x="connsiteX12" y="connsiteY12"/>
-              </a:cxn>
-              <a:cxn ang="0">
-                <a:pos x="connsiteX13" y="connsiteY13"/>
-              </a:cxn>
-              <a:cxn ang="0">
-                <a:pos x="connsiteX14" y="connsiteY14"/>
-              </a:cxn>
-              <a:cxn ang="0">
-                <a:pos x="connsiteX15" y="connsiteY15"/>
-              </a:cxn>
-            </a:cxnLst>
-            <a:rect l="l" t="t" r="r" b="b"/>
-            <a:pathLst>
-              <a:path w="2517059" h="541483">
-                <a:moveTo>
-                  <a:pt x="0" y="63521"/>
-                </a:moveTo>
-                <a:cubicBezTo>
-                  <a:pt x="50800" y="98753"/>
-                  <a:pt x="101600" y="133985"/>
-                  <a:pt x="147484" y="161843"/>
-                </a:cubicBezTo>
-                <a:cubicBezTo>
-                  <a:pt x="193368" y="189701"/>
-                  <a:pt x="226143" y="222475"/>
-                  <a:pt x="275304" y="230669"/>
-                </a:cubicBezTo>
-                <a:cubicBezTo>
-                  <a:pt x="324465" y="238863"/>
-                  <a:pt x="380181" y="168399"/>
-                  <a:pt x="442452" y="211005"/>
-                </a:cubicBezTo>
-                <a:cubicBezTo>
-                  <a:pt x="504723" y="253611"/>
-                  <a:pt x="576827" y="435508"/>
-                  <a:pt x="648930" y="486308"/>
-                </a:cubicBezTo>
-                <a:cubicBezTo>
-                  <a:pt x="721033" y="537108"/>
-                  <a:pt x="825910" y="564966"/>
-                  <a:pt x="875071" y="515805"/>
-                </a:cubicBezTo>
-                <a:cubicBezTo>
-                  <a:pt x="924232" y="466644"/>
-                  <a:pt x="916039" y="225753"/>
-                  <a:pt x="943897" y="191340"/>
-                </a:cubicBezTo>
-                <a:cubicBezTo>
-                  <a:pt x="971755" y="156927"/>
-                  <a:pt x="1019278" y="340462"/>
-                  <a:pt x="1042220" y="309327"/>
-                </a:cubicBezTo>
-                <a:cubicBezTo>
-                  <a:pt x="1065162" y="278192"/>
-                  <a:pt x="1063523" y="35662"/>
-                  <a:pt x="1081549" y="4527"/>
-                </a:cubicBezTo>
-                <a:cubicBezTo>
-                  <a:pt x="1099575" y="-26609"/>
-                  <a:pt x="1120878" y="112682"/>
-                  <a:pt x="1150375" y="122514"/>
-                </a:cubicBezTo>
-                <a:cubicBezTo>
-                  <a:pt x="1179872" y="132346"/>
-                  <a:pt x="1189704" y="25831"/>
-                  <a:pt x="1258530" y="63521"/>
-                </a:cubicBezTo>
-                <a:cubicBezTo>
-                  <a:pt x="1327356" y="101211"/>
-                  <a:pt x="1458453" y="353572"/>
-                  <a:pt x="1563330" y="348656"/>
-                </a:cubicBezTo>
-                <a:cubicBezTo>
-                  <a:pt x="1668207" y="343740"/>
-                  <a:pt x="1779639" y="73353"/>
-                  <a:pt x="1887794" y="34024"/>
-                </a:cubicBezTo>
-                <a:cubicBezTo>
-                  <a:pt x="1995949" y="-5305"/>
-                  <a:pt x="2133601" y="111043"/>
-                  <a:pt x="2212259" y="112682"/>
-                </a:cubicBezTo>
-                <a:cubicBezTo>
-                  <a:pt x="2290917" y="114321"/>
-                  <a:pt x="2308942" y="45495"/>
-                  <a:pt x="2359742" y="43856"/>
-                </a:cubicBezTo>
-                <a:cubicBezTo>
-                  <a:pt x="2410542" y="42217"/>
-                  <a:pt x="2463800" y="72533"/>
-                  <a:pt x="2517059" y="102850"/>
-                </a:cubicBezTo>
-              </a:path>
-            </a:pathLst>
-          </a:custGeom>
-          <a:noFill/>
-          <a:ln w="19050">
-            <a:solidFill>
-              <a:schemeClr val="tx2"/>
-            </a:solidFill>
-            <a:prstDash val="sysDash"/>
-          </a:ln>
+          </a:prstGeom>
+          <a:solidFill>
+            <a:schemeClr val="accent6">
+              <a:lumMod val="75000"/>
+            </a:schemeClr>
+          </a:solidFill>
+          <a:scene3d>
+            <a:camera prst="orthographicFront"/>
+            <a:lightRig rig="threePt" dir="t"/>
+          </a:scene3d>
+          <a:sp3d>
+            <a:bevelT/>
+          </a:sp3d>
         </p:spPr>
         <p:style>
           <a:lnRef idx="2">
@@ -18773,20 +18613,106 @@
           </a:fontRef>
         </p:style>
         <p:txBody>
-          <a:bodyPr rtlCol="0" anchor="ctr"/>
+          <a:bodyPr rot="0" spcFirstLastPara="0" vertOverflow="overflow" horzOverflow="overflow" vert="horz" wrap="square" lIns="91440" tIns="45720" rIns="91440" bIns="45720" numCol="1" spcCol="0" rtlCol="0" fromWordArt="0" anchor="ctr" anchorCtr="0" forceAA="0" compatLnSpc="1">
+            <a:prstTxWarp prst="textNoShape">
+              <a:avLst/>
+            </a:prstTxWarp>
+            <a:noAutofit/>
+          </a:bodyPr>
           <a:lstStyle/>
           <a:p>
             <a:pPr algn="ctr"/>
-            <a:endParaRPr lang="en-US"/>
-          </a:p>
-        </p:txBody>
-      </p:sp>
-      <p:sp>
-        <p:nvSpPr>
-          <p:cNvPr id="7" name="Rectangle: Rounded Corners 6">
-            <a:extLst>
-              <a:ext uri="{FF2B5EF4-FFF2-40B4-BE49-F238E27FC236}">
-                <a16:creationId xmlns:a16="http://schemas.microsoft.com/office/drawing/2014/main" id="{E449594F-066B-40F6-B7E9-24E3088259BE}"/>
+            <a:r>
+              <a:rPr lang="en-US" sz="1200" dirty="0"/>
+              <a:t>Update Price Forecast</a:t>
+            </a:r>
+          </a:p>
+        </p:txBody>
+      </p:sp>
+      <p:sp>
+        <p:nvSpPr>
+          <p:cNvPr id="4" name="TextBox 3">
+            <a:extLst>
+              <a:ext uri="{FF2B5EF4-FFF2-40B4-BE49-F238E27FC236}">
+                <a16:creationId xmlns:a16="http://schemas.microsoft.com/office/drawing/2014/main" id="{124B4EED-7DC3-4F41-9893-B5AB67084D79}"/>
+              </a:ext>
+            </a:extLst>
+          </p:cNvPr>
+          <p:cNvSpPr txBox="1"/>
+          <p:nvPr/>
+        </p:nvSpPr>
+        <p:spPr bwMode="auto">
+          <a:xfrm>
+            <a:off x="4226860" y="4153989"/>
+            <a:ext cx="4551380" cy="261257"/>
+          </a:xfrm>
+          <a:prstGeom prst="rect">
+            <a:avLst/>
+          </a:prstGeom>
+          <a:noFill/>
+          <a:ln>
+            <a:noFill/>
+          </a:ln>
+          <a:extLst>
+            <a:ext uri="{909E8E84-426E-40dd-AFC4-6F175D3DCCD1}">
+              <a14:hiddenFill xmlns="" xmlns:a14="http://schemas.microsoft.com/office/drawing/2010/main">
+                <a:solidFill>
+                  <a:srgbClr val="FFFFFF"/>
+                </a:solidFill>
+              </a14:hiddenFill>
+            </a:ext>
+            <a:ext uri="{91240B29-F687-4f45-9708-019B960494DF}">
+              <a14:hiddenLine xmlns="" xmlns:a14="http://schemas.microsoft.com/office/drawing/2010/main" w="9525">
+                <a:solidFill>
+                  <a:srgbClr val="000000"/>
+                </a:solidFill>
+                <a:miter lim="800000"/>
+                <a:headEnd/>
+                <a:tailEnd/>
+              </a14:hiddenLine>
+            </a:ext>
+            <a:ext uri="{FAA26D3D-D897-4be2-8F04-BA451C77F1D7}">
+              <ma14:placeholderFlag xmlns="" xmlns:ma14="http://schemas.microsoft.com/office/mac/drawingml/2011/main" val="1"/>
+            </a:ext>
+          </a:extLst>
+        </p:spPr>
+        <p:txBody>
+          <a:bodyPr vert="horz" wrap="square" lIns="0" tIns="0" rIns="0" bIns="0" numCol="1" rtlCol="0" anchor="t" anchorCtr="0" compatLnSpc="1">
+            <a:prstTxWarp prst="textNoShape">
+              <a:avLst/>
+            </a:prstTxWarp>
+            <a:normAutofit/>
+          </a:bodyPr>
+          <a:lstStyle/>
+          <a:p>
+            <a:pPr algn="l">
+              <a:spcBef>
+                <a:spcPts val="600"/>
+              </a:spcBef>
+              <a:spcAft>
+                <a:spcPts val="600"/>
+              </a:spcAft>
+              <a:buClr>
+                <a:schemeClr val="accent1"/>
+              </a:buClr>
+            </a:pPr>
+            <a:r>
+              <a:rPr lang="en-US" sz="1700" dirty="0">
+                <a:solidFill>
+                  <a:schemeClr val="accent2"/>
+                </a:solidFill>
+              </a:rPr>
+              <a:t>00:00                   12:00		24:00</a:t>
+            </a:r>
+          </a:p>
+        </p:txBody>
+      </p:sp>
+      <p:sp>
+        <p:nvSpPr>
+          <p:cNvPr id="9" name="Freeform: Shape 8">
+            <a:extLst>
+              <a:ext uri="{FF2B5EF4-FFF2-40B4-BE49-F238E27FC236}">
+                <a16:creationId xmlns:a16="http://schemas.microsoft.com/office/drawing/2014/main" id="{A28E9969-275E-4183-8C03-3278B292F877}"/>
               </a:ext>
             </a:extLst>
           </p:cNvPr>
@@ -18795,24 +18721,399 @@
         </p:nvSpPr>
         <p:spPr>
           <a:xfrm>
-            <a:off x="4983629" y="5339789"/>
-            <a:ext cx="2438400" cy="365797"/>
-          </a:xfrm>
-          <a:prstGeom prst="roundRect">
+            <a:off x="4223657" y="2834052"/>
+            <a:ext cx="3997234" cy="371320"/>
+          </a:xfrm>
+          <a:custGeom>
             <a:avLst/>
-          </a:prstGeom>
-          <a:solidFill>
-            <a:schemeClr val="accent6">
-              <a:lumMod val="75000"/>
-            </a:schemeClr>
-          </a:solidFill>
-          <a:scene3d>
-            <a:camera prst="orthographicFront"/>
-            <a:lightRig rig="threePt" dir="t"/>
-          </a:scene3d>
-          <a:sp3d>
-            <a:bevelT/>
-          </a:sp3d>
+            <a:gdLst>
+              <a:gd name="connsiteX0" fmla="*/ 0 w 3997234"/>
+              <a:gd name="connsiteY0" fmla="*/ 292325 h 371320"/>
+              <a:gd name="connsiteX1" fmla="*/ 217714 w 3997234"/>
+              <a:gd name="connsiteY1" fmla="*/ 292325 h 371320"/>
+              <a:gd name="connsiteX2" fmla="*/ 296092 w 3997234"/>
+              <a:gd name="connsiteY2" fmla="*/ 309742 h 371320"/>
+              <a:gd name="connsiteX3" fmla="*/ 357052 w 3997234"/>
+              <a:gd name="connsiteY3" fmla="*/ 318451 h 371320"/>
+              <a:gd name="connsiteX4" fmla="*/ 383177 w 3997234"/>
+              <a:gd name="connsiteY4" fmla="*/ 327159 h 371320"/>
+              <a:gd name="connsiteX5" fmla="*/ 505097 w 3997234"/>
+              <a:gd name="connsiteY5" fmla="*/ 344577 h 371320"/>
+              <a:gd name="connsiteX6" fmla="*/ 792480 w 3997234"/>
+              <a:gd name="connsiteY6" fmla="*/ 344577 h 371320"/>
+              <a:gd name="connsiteX7" fmla="*/ 836023 w 3997234"/>
+              <a:gd name="connsiteY7" fmla="*/ 335868 h 371320"/>
+              <a:gd name="connsiteX8" fmla="*/ 957943 w 3997234"/>
+              <a:gd name="connsiteY8" fmla="*/ 318451 h 371320"/>
+              <a:gd name="connsiteX9" fmla="*/ 1219200 w 3997234"/>
+              <a:gd name="connsiteY9" fmla="*/ 309742 h 371320"/>
+              <a:gd name="connsiteX10" fmla="*/ 1271452 w 3997234"/>
+              <a:gd name="connsiteY10" fmla="*/ 301034 h 371320"/>
+              <a:gd name="connsiteX11" fmla="*/ 1341120 w 3997234"/>
+              <a:gd name="connsiteY11" fmla="*/ 292325 h 371320"/>
+              <a:gd name="connsiteX12" fmla="*/ 1393372 w 3997234"/>
+              <a:gd name="connsiteY12" fmla="*/ 274908 h 371320"/>
+              <a:gd name="connsiteX13" fmla="*/ 1471749 w 3997234"/>
+              <a:gd name="connsiteY13" fmla="*/ 213948 h 371320"/>
+              <a:gd name="connsiteX14" fmla="*/ 1558834 w 3997234"/>
+              <a:gd name="connsiteY14" fmla="*/ 135571 h 371320"/>
+              <a:gd name="connsiteX15" fmla="*/ 1619794 w 3997234"/>
+              <a:gd name="connsiteY15" fmla="*/ 109445 h 371320"/>
+              <a:gd name="connsiteX16" fmla="*/ 1654629 w 3997234"/>
+              <a:gd name="connsiteY16" fmla="*/ 92028 h 371320"/>
+              <a:gd name="connsiteX17" fmla="*/ 1689463 w 3997234"/>
+              <a:gd name="connsiteY17" fmla="*/ 83319 h 371320"/>
+              <a:gd name="connsiteX18" fmla="*/ 1715589 w 3997234"/>
+              <a:gd name="connsiteY18" fmla="*/ 74611 h 371320"/>
+              <a:gd name="connsiteX19" fmla="*/ 1759132 w 3997234"/>
+              <a:gd name="connsiteY19" fmla="*/ 65902 h 371320"/>
+              <a:gd name="connsiteX20" fmla="*/ 1802674 w 3997234"/>
+              <a:gd name="connsiteY20" fmla="*/ 48485 h 371320"/>
+              <a:gd name="connsiteX21" fmla="*/ 1915886 w 3997234"/>
+              <a:gd name="connsiteY21" fmla="*/ 31068 h 371320"/>
+              <a:gd name="connsiteX22" fmla="*/ 2882537 w 3997234"/>
+              <a:gd name="connsiteY22" fmla="*/ 4942 h 371320"/>
+              <a:gd name="connsiteX23" fmla="*/ 3030583 w 3997234"/>
+              <a:gd name="connsiteY23" fmla="*/ 22359 h 371320"/>
+              <a:gd name="connsiteX24" fmla="*/ 3082834 w 3997234"/>
+              <a:gd name="connsiteY24" fmla="*/ 39777 h 371320"/>
+              <a:gd name="connsiteX25" fmla="*/ 3100252 w 3997234"/>
+              <a:gd name="connsiteY25" fmla="*/ 65902 h 371320"/>
+              <a:gd name="connsiteX26" fmla="*/ 3126377 w 3997234"/>
+              <a:gd name="connsiteY26" fmla="*/ 100737 h 371320"/>
+              <a:gd name="connsiteX27" fmla="*/ 3161212 w 3997234"/>
+              <a:gd name="connsiteY27" fmla="*/ 170405 h 371320"/>
+              <a:gd name="connsiteX28" fmla="*/ 3187337 w 3997234"/>
+              <a:gd name="connsiteY28" fmla="*/ 222657 h 371320"/>
+              <a:gd name="connsiteX29" fmla="*/ 3257006 w 3997234"/>
+              <a:gd name="connsiteY29" fmla="*/ 266199 h 371320"/>
+              <a:gd name="connsiteX30" fmla="*/ 3283132 w 3997234"/>
+              <a:gd name="connsiteY30" fmla="*/ 283617 h 371320"/>
+              <a:gd name="connsiteX31" fmla="*/ 3326674 w 3997234"/>
+              <a:gd name="connsiteY31" fmla="*/ 309742 h 371320"/>
+              <a:gd name="connsiteX32" fmla="*/ 3387634 w 3997234"/>
+              <a:gd name="connsiteY32" fmla="*/ 353285 h 371320"/>
+              <a:gd name="connsiteX33" fmla="*/ 3413760 w 3997234"/>
+              <a:gd name="connsiteY33" fmla="*/ 370702 h 371320"/>
+              <a:gd name="connsiteX34" fmla="*/ 3657600 w 3997234"/>
+              <a:gd name="connsiteY34" fmla="*/ 361994 h 371320"/>
+              <a:gd name="connsiteX35" fmla="*/ 3692434 w 3997234"/>
+              <a:gd name="connsiteY35" fmla="*/ 353285 h 371320"/>
+              <a:gd name="connsiteX36" fmla="*/ 3753394 w 3997234"/>
+              <a:gd name="connsiteY36" fmla="*/ 344577 h 371320"/>
+              <a:gd name="connsiteX37" fmla="*/ 3997234 w 3997234"/>
+              <a:gd name="connsiteY37" fmla="*/ 335868 h 371320"/>
+            </a:gdLst>
+            <a:ahLst/>
+            <a:cxnLst>
+              <a:cxn ang="0">
+                <a:pos x="connsiteX0" y="connsiteY0"/>
+              </a:cxn>
+              <a:cxn ang="0">
+                <a:pos x="connsiteX1" y="connsiteY1"/>
+              </a:cxn>
+              <a:cxn ang="0">
+                <a:pos x="connsiteX2" y="connsiteY2"/>
+              </a:cxn>
+              <a:cxn ang="0">
+                <a:pos x="connsiteX3" y="connsiteY3"/>
+              </a:cxn>
+              <a:cxn ang="0">
+                <a:pos x="connsiteX4" y="connsiteY4"/>
+              </a:cxn>
+              <a:cxn ang="0">
+                <a:pos x="connsiteX5" y="connsiteY5"/>
+              </a:cxn>
+              <a:cxn ang="0">
+                <a:pos x="connsiteX6" y="connsiteY6"/>
+              </a:cxn>
+              <a:cxn ang="0">
+                <a:pos x="connsiteX7" y="connsiteY7"/>
+              </a:cxn>
+              <a:cxn ang="0">
+                <a:pos x="connsiteX8" y="connsiteY8"/>
+              </a:cxn>
+              <a:cxn ang="0">
+                <a:pos x="connsiteX9" y="connsiteY9"/>
+              </a:cxn>
+              <a:cxn ang="0">
+                <a:pos x="connsiteX10" y="connsiteY10"/>
+              </a:cxn>
+              <a:cxn ang="0">
+                <a:pos x="connsiteX11" y="connsiteY11"/>
+              </a:cxn>
+              <a:cxn ang="0">
+                <a:pos x="connsiteX12" y="connsiteY12"/>
+              </a:cxn>
+              <a:cxn ang="0">
+                <a:pos x="connsiteX13" y="connsiteY13"/>
+              </a:cxn>
+              <a:cxn ang="0">
+                <a:pos x="connsiteX14" y="connsiteY14"/>
+              </a:cxn>
+              <a:cxn ang="0">
+                <a:pos x="connsiteX15" y="connsiteY15"/>
+              </a:cxn>
+              <a:cxn ang="0">
+                <a:pos x="connsiteX16" y="connsiteY16"/>
+              </a:cxn>
+              <a:cxn ang="0">
+                <a:pos x="connsiteX17" y="connsiteY17"/>
+              </a:cxn>
+              <a:cxn ang="0">
+                <a:pos x="connsiteX18" y="connsiteY18"/>
+              </a:cxn>
+              <a:cxn ang="0">
+                <a:pos x="connsiteX19" y="connsiteY19"/>
+              </a:cxn>
+              <a:cxn ang="0">
+                <a:pos x="connsiteX20" y="connsiteY20"/>
+              </a:cxn>
+              <a:cxn ang="0">
+                <a:pos x="connsiteX21" y="connsiteY21"/>
+              </a:cxn>
+              <a:cxn ang="0">
+                <a:pos x="connsiteX22" y="connsiteY22"/>
+              </a:cxn>
+              <a:cxn ang="0">
+                <a:pos x="connsiteX23" y="connsiteY23"/>
+              </a:cxn>
+              <a:cxn ang="0">
+                <a:pos x="connsiteX24" y="connsiteY24"/>
+              </a:cxn>
+              <a:cxn ang="0">
+                <a:pos x="connsiteX25" y="connsiteY25"/>
+              </a:cxn>
+              <a:cxn ang="0">
+                <a:pos x="connsiteX26" y="connsiteY26"/>
+              </a:cxn>
+              <a:cxn ang="0">
+                <a:pos x="connsiteX27" y="connsiteY27"/>
+              </a:cxn>
+              <a:cxn ang="0">
+                <a:pos x="connsiteX28" y="connsiteY28"/>
+              </a:cxn>
+              <a:cxn ang="0">
+                <a:pos x="connsiteX29" y="connsiteY29"/>
+              </a:cxn>
+              <a:cxn ang="0">
+                <a:pos x="connsiteX30" y="connsiteY30"/>
+              </a:cxn>
+              <a:cxn ang="0">
+                <a:pos x="connsiteX31" y="connsiteY31"/>
+              </a:cxn>
+              <a:cxn ang="0">
+                <a:pos x="connsiteX32" y="connsiteY32"/>
+              </a:cxn>
+              <a:cxn ang="0">
+                <a:pos x="connsiteX33" y="connsiteY33"/>
+              </a:cxn>
+              <a:cxn ang="0">
+                <a:pos x="connsiteX34" y="connsiteY34"/>
+              </a:cxn>
+              <a:cxn ang="0">
+                <a:pos x="connsiteX35" y="connsiteY35"/>
+              </a:cxn>
+              <a:cxn ang="0">
+                <a:pos x="connsiteX36" y="connsiteY36"/>
+              </a:cxn>
+              <a:cxn ang="0">
+                <a:pos x="connsiteX37" y="connsiteY37"/>
+              </a:cxn>
+            </a:cxnLst>
+            <a:rect l="l" t="t" r="r" b="b"/>
+            <a:pathLst>
+              <a:path w="3997234" h="371320">
+                <a:moveTo>
+                  <a:pt x="0" y="292325"/>
+                </a:moveTo>
+                <a:cubicBezTo>
+                  <a:pt x="118174" y="282478"/>
+                  <a:pt x="95688" y="278767"/>
+                  <a:pt x="217714" y="292325"/>
+                </a:cubicBezTo>
+                <a:cubicBezTo>
+                  <a:pt x="262141" y="297261"/>
+                  <a:pt x="255673" y="302393"/>
+                  <a:pt x="296092" y="309742"/>
+                </a:cubicBezTo>
+                <a:cubicBezTo>
+                  <a:pt x="316287" y="313414"/>
+                  <a:pt x="336732" y="315548"/>
+                  <a:pt x="357052" y="318451"/>
+                </a:cubicBezTo>
+                <a:cubicBezTo>
+                  <a:pt x="365760" y="321354"/>
+                  <a:pt x="374137" y="325564"/>
+                  <a:pt x="383177" y="327159"/>
+                </a:cubicBezTo>
+                <a:cubicBezTo>
+                  <a:pt x="423605" y="334293"/>
+                  <a:pt x="505097" y="344577"/>
+                  <a:pt x="505097" y="344577"/>
+                </a:cubicBezTo>
+                <a:cubicBezTo>
+                  <a:pt x="612149" y="380258"/>
+                  <a:pt x="538540" y="359088"/>
+                  <a:pt x="792480" y="344577"/>
+                </a:cubicBezTo>
+                <a:cubicBezTo>
+                  <a:pt x="807258" y="343733"/>
+                  <a:pt x="821402" y="338177"/>
+                  <a:pt x="836023" y="335868"/>
+                </a:cubicBezTo>
+                <a:cubicBezTo>
+                  <a:pt x="876573" y="329465"/>
+                  <a:pt x="916913" y="319819"/>
+                  <a:pt x="957943" y="318451"/>
+                </a:cubicBezTo>
+                <a:lnTo>
+                  <a:pt x="1219200" y="309742"/>
+                </a:lnTo>
+                <a:cubicBezTo>
+                  <a:pt x="1236617" y="306839"/>
+                  <a:pt x="1253972" y="303531"/>
+                  <a:pt x="1271452" y="301034"/>
+                </a:cubicBezTo>
+                <a:cubicBezTo>
+                  <a:pt x="1294620" y="297724"/>
+                  <a:pt x="1318236" y="297229"/>
+                  <a:pt x="1341120" y="292325"/>
+                </a:cubicBezTo>
+                <a:cubicBezTo>
+                  <a:pt x="1359072" y="288478"/>
+                  <a:pt x="1375955" y="280714"/>
+                  <a:pt x="1393372" y="274908"/>
+                </a:cubicBezTo>
+                <a:cubicBezTo>
+                  <a:pt x="1419498" y="254588"/>
+                  <a:pt x="1451073" y="239793"/>
+                  <a:pt x="1471749" y="213948"/>
+                </a:cubicBezTo>
+                <a:cubicBezTo>
+                  <a:pt x="1506297" y="170763"/>
+                  <a:pt x="1506166" y="161904"/>
+                  <a:pt x="1558834" y="135571"/>
+                </a:cubicBezTo>
+                <a:cubicBezTo>
+                  <a:pt x="1674370" y="77805"/>
+                  <a:pt x="1530096" y="147887"/>
+                  <a:pt x="1619794" y="109445"/>
+                </a:cubicBezTo>
+                <a:cubicBezTo>
+                  <a:pt x="1631726" y="104331"/>
+                  <a:pt x="1642473" y="96586"/>
+                  <a:pt x="1654629" y="92028"/>
+                </a:cubicBezTo>
+                <a:cubicBezTo>
+                  <a:pt x="1665836" y="87825"/>
+                  <a:pt x="1677955" y="86607"/>
+                  <a:pt x="1689463" y="83319"/>
+                </a:cubicBezTo>
+                <a:cubicBezTo>
+                  <a:pt x="1698289" y="80797"/>
+                  <a:pt x="1706683" y="76837"/>
+                  <a:pt x="1715589" y="74611"/>
+                </a:cubicBezTo>
+                <a:cubicBezTo>
+                  <a:pt x="1729949" y="71021"/>
+                  <a:pt x="1744954" y="70155"/>
+                  <a:pt x="1759132" y="65902"/>
+                </a:cubicBezTo>
+                <a:cubicBezTo>
+                  <a:pt x="1774105" y="61410"/>
+                  <a:pt x="1787701" y="52977"/>
+                  <a:pt x="1802674" y="48485"/>
+                </a:cubicBezTo>
+                <a:cubicBezTo>
+                  <a:pt x="1832231" y="39618"/>
+                  <a:pt x="1889930" y="34607"/>
+                  <a:pt x="1915886" y="31068"/>
+                </a:cubicBezTo>
+                <a:cubicBezTo>
+                  <a:pt x="2337201" y="-26385"/>
+                  <a:pt x="1855228" y="15533"/>
+                  <a:pt x="2882537" y="4942"/>
+                </a:cubicBezTo>
+                <a:cubicBezTo>
+                  <a:pt x="2956946" y="10666"/>
+                  <a:pt x="2975074" y="5706"/>
+                  <a:pt x="3030583" y="22359"/>
+                </a:cubicBezTo>
+                <a:cubicBezTo>
+                  <a:pt x="3048168" y="27635"/>
+                  <a:pt x="3082834" y="39777"/>
+                  <a:pt x="3082834" y="39777"/>
+                </a:cubicBezTo>
+                <a:cubicBezTo>
+                  <a:pt x="3088640" y="48485"/>
+                  <a:pt x="3094169" y="57385"/>
+                  <a:pt x="3100252" y="65902"/>
+                </a:cubicBezTo>
+                <a:cubicBezTo>
+                  <a:pt x="3108688" y="77713"/>
+                  <a:pt x="3119886" y="87755"/>
+                  <a:pt x="3126377" y="100737"/>
+                </a:cubicBezTo>
+                <a:cubicBezTo>
+                  <a:pt x="3166401" y="180787"/>
+                  <a:pt x="3121863" y="131058"/>
+                  <a:pt x="3161212" y="170405"/>
+                </a:cubicBezTo>
+                <a:cubicBezTo>
+                  <a:pt x="3168294" y="191654"/>
+                  <a:pt x="3170455" y="205775"/>
+                  <a:pt x="3187337" y="222657"/>
+                </a:cubicBezTo>
+                <a:cubicBezTo>
+                  <a:pt x="3215087" y="250407"/>
+                  <a:pt x="3224816" y="247804"/>
+                  <a:pt x="3257006" y="266199"/>
+                </a:cubicBezTo>
+                <a:cubicBezTo>
+                  <a:pt x="3266094" y="271392"/>
+                  <a:pt x="3274256" y="278070"/>
+                  <a:pt x="3283132" y="283617"/>
+                </a:cubicBezTo>
+                <a:cubicBezTo>
+                  <a:pt x="3297485" y="292588"/>
+                  <a:pt x="3313313" y="299350"/>
+                  <a:pt x="3326674" y="309742"/>
+                </a:cubicBezTo>
+                <a:cubicBezTo>
+                  <a:pt x="3388662" y="357955"/>
+                  <a:pt x="3334380" y="335534"/>
+                  <a:pt x="3387634" y="353285"/>
+                </a:cubicBezTo>
+                <a:cubicBezTo>
+                  <a:pt x="3396343" y="359091"/>
+                  <a:pt x="3403299" y="370365"/>
+                  <a:pt x="3413760" y="370702"/>
+                </a:cubicBezTo>
+                <a:cubicBezTo>
+                  <a:pt x="3495050" y="373324"/>
+                  <a:pt x="3576427" y="367067"/>
+                  <a:pt x="3657600" y="361994"/>
+                </a:cubicBezTo>
+                <a:cubicBezTo>
+                  <a:pt x="3669545" y="361247"/>
+                  <a:pt x="3680658" y="355426"/>
+                  <a:pt x="3692434" y="353285"/>
+                </a:cubicBezTo>
+                <a:cubicBezTo>
+                  <a:pt x="3712629" y="349613"/>
+                  <a:pt x="3733074" y="347480"/>
+                  <a:pt x="3753394" y="344577"/>
+                </a:cubicBezTo>
+                <a:cubicBezTo>
+                  <a:pt x="3848367" y="312918"/>
+                  <a:pt x="3770340" y="335868"/>
+                  <a:pt x="3997234" y="335868"/>
+                </a:cubicBezTo>
+              </a:path>
+            </a:pathLst>
+          </a:custGeom>
+          <a:noFill/>
         </p:spPr>
         <p:style>
           <a:lnRef idx="2">
@@ -18831,28 +19132,20 @@
           </a:fontRef>
         </p:style>
         <p:txBody>
-          <a:bodyPr rot="0" spcFirstLastPara="0" vertOverflow="overflow" horzOverflow="overflow" vert="horz" wrap="square" lIns="91440" tIns="45720" rIns="91440" bIns="45720" numCol="1" spcCol="0" rtlCol="0" fromWordArt="0" anchor="ctr" anchorCtr="0" forceAA="0" compatLnSpc="1">
-            <a:prstTxWarp prst="textNoShape">
-              <a:avLst/>
-            </a:prstTxWarp>
-            <a:noAutofit/>
-          </a:bodyPr>
+          <a:bodyPr rtlCol="0" anchor="ctr"/>
           <a:lstStyle/>
           <a:p>
             <a:pPr algn="ctr"/>
-            <a:r>
-              <a:rPr lang="en-US" sz="1200" dirty="0"/>
-              <a:t>Update Price Forecast</a:t>
-            </a:r>
-          </a:p>
-        </p:txBody>
-      </p:sp>
-      <p:sp>
-        <p:nvSpPr>
-          <p:cNvPr id="8" name="Freeform: Shape 7">
-            <a:extLst>
-              <a:ext uri="{FF2B5EF4-FFF2-40B4-BE49-F238E27FC236}">
-                <a16:creationId xmlns:a16="http://schemas.microsoft.com/office/drawing/2014/main" id="{BB8F5B72-28AE-492A-96DB-4A48D4ED39F3}"/>
+            <a:endParaRPr lang="en-US"/>
+          </a:p>
+        </p:txBody>
+      </p:sp>
+      <p:sp>
+        <p:nvSpPr>
+          <p:cNvPr id="10" name="Freeform: Shape 9">
+            <a:extLst>
+              <a:ext uri="{FF2B5EF4-FFF2-40B4-BE49-F238E27FC236}">
+                <a16:creationId xmlns:a16="http://schemas.microsoft.com/office/drawing/2014/main" id="{FF5B1284-0927-411E-8133-5C5FB601F5FC}"/>
               </a:ext>
             </a:extLst>
           </p:cNvPr>
@@ -18861,44 +19154,88 @@
         </p:nvSpPr>
         <p:spPr>
           <a:xfrm>
-            <a:off x="4251008" y="2532106"/>
-            <a:ext cx="3838892" cy="934994"/>
+            <a:off x="4367348" y="2842173"/>
+            <a:ext cx="3997234" cy="371320"/>
           </a:xfrm>
           <a:custGeom>
             <a:avLst/>
             <a:gdLst>
-              <a:gd name="connsiteX0" fmla="*/ 0 w 2517059"/>
-              <a:gd name="connsiteY0" fmla="*/ 63521 h 541483"/>
-              <a:gd name="connsiteX1" fmla="*/ 147484 w 2517059"/>
-              <a:gd name="connsiteY1" fmla="*/ 161843 h 541483"/>
-              <a:gd name="connsiteX2" fmla="*/ 275304 w 2517059"/>
-              <a:gd name="connsiteY2" fmla="*/ 230669 h 541483"/>
-              <a:gd name="connsiteX3" fmla="*/ 442452 w 2517059"/>
-              <a:gd name="connsiteY3" fmla="*/ 211005 h 541483"/>
-              <a:gd name="connsiteX4" fmla="*/ 648930 w 2517059"/>
-              <a:gd name="connsiteY4" fmla="*/ 486308 h 541483"/>
-              <a:gd name="connsiteX5" fmla="*/ 875071 w 2517059"/>
-              <a:gd name="connsiteY5" fmla="*/ 515805 h 541483"/>
-              <a:gd name="connsiteX6" fmla="*/ 943897 w 2517059"/>
-              <a:gd name="connsiteY6" fmla="*/ 191340 h 541483"/>
-              <a:gd name="connsiteX7" fmla="*/ 1042220 w 2517059"/>
-              <a:gd name="connsiteY7" fmla="*/ 309327 h 541483"/>
-              <a:gd name="connsiteX8" fmla="*/ 1081549 w 2517059"/>
-              <a:gd name="connsiteY8" fmla="*/ 4527 h 541483"/>
-              <a:gd name="connsiteX9" fmla="*/ 1150375 w 2517059"/>
-              <a:gd name="connsiteY9" fmla="*/ 122514 h 541483"/>
-              <a:gd name="connsiteX10" fmla="*/ 1258530 w 2517059"/>
-              <a:gd name="connsiteY10" fmla="*/ 63521 h 541483"/>
-              <a:gd name="connsiteX11" fmla="*/ 1563330 w 2517059"/>
-              <a:gd name="connsiteY11" fmla="*/ 348656 h 541483"/>
-              <a:gd name="connsiteX12" fmla="*/ 1887794 w 2517059"/>
-              <a:gd name="connsiteY12" fmla="*/ 34024 h 541483"/>
-              <a:gd name="connsiteX13" fmla="*/ 2212259 w 2517059"/>
-              <a:gd name="connsiteY13" fmla="*/ 112682 h 541483"/>
-              <a:gd name="connsiteX14" fmla="*/ 2359742 w 2517059"/>
-              <a:gd name="connsiteY14" fmla="*/ 43856 h 541483"/>
-              <a:gd name="connsiteX15" fmla="*/ 2517059 w 2517059"/>
-              <a:gd name="connsiteY15" fmla="*/ 102850 h 541483"/>
+              <a:gd name="connsiteX0" fmla="*/ 0 w 3997234"/>
+              <a:gd name="connsiteY0" fmla="*/ 292325 h 371320"/>
+              <a:gd name="connsiteX1" fmla="*/ 217714 w 3997234"/>
+              <a:gd name="connsiteY1" fmla="*/ 292325 h 371320"/>
+              <a:gd name="connsiteX2" fmla="*/ 296092 w 3997234"/>
+              <a:gd name="connsiteY2" fmla="*/ 309742 h 371320"/>
+              <a:gd name="connsiteX3" fmla="*/ 357052 w 3997234"/>
+              <a:gd name="connsiteY3" fmla="*/ 318451 h 371320"/>
+              <a:gd name="connsiteX4" fmla="*/ 383177 w 3997234"/>
+              <a:gd name="connsiteY4" fmla="*/ 327159 h 371320"/>
+              <a:gd name="connsiteX5" fmla="*/ 505097 w 3997234"/>
+              <a:gd name="connsiteY5" fmla="*/ 344577 h 371320"/>
+              <a:gd name="connsiteX6" fmla="*/ 792480 w 3997234"/>
+              <a:gd name="connsiteY6" fmla="*/ 344577 h 371320"/>
+              <a:gd name="connsiteX7" fmla="*/ 836023 w 3997234"/>
+              <a:gd name="connsiteY7" fmla="*/ 335868 h 371320"/>
+              <a:gd name="connsiteX8" fmla="*/ 957943 w 3997234"/>
+              <a:gd name="connsiteY8" fmla="*/ 318451 h 371320"/>
+              <a:gd name="connsiteX9" fmla="*/ 1219200 w 3997234"/>
+              <a:gd name="connsiteY9" fmla="*/ 309742 h 371320"/>
+              <a:gd name="connsiteX10" fmla="*/ 1271452 w 3997234"/>
+              <a:gd name="connsiteY10" fmla="*/ 301034 h 371320"/>
+              <a:gd name="connsiteX11" fmla="*/ 1341120 w 3997234"/>
+              <a:gd name="connsiteY11" fmla="*/ 292325 h 371320"/>
+              <a:gd name="connsiteX12" fmla="*/ 1393372 w 3997234"/>
+              <a:gd name="connsiteY12" fmla="*/ 274908 h 371320"/>
+              <a:gd name="connsiteX13" fmla="*/ 1471749 w 3997234"/>
+              <a:gd name="connsiteY13" fmla="*/ 213948 h 371320"/>
+              <a:gd name="connsiteX14" fmla="*/ 1558834 w 3997234"/>
+              <a:gd name="connsiteY14" fmla="*/ 135571 h 371320"/>
+              <a:gd name="connsiteX15" fmla="*/ 1619794 w 3997234"/>
+              <a:gd name="connsiteY15" fmla="*/ 109445 h 371320"/>
+              <a:gd name="connsiteX16" fmla="*/ 1654629 w 3997234"/>
+              <a:gd name="connsiteY16" fmla="*/ 92028 h 371320"/>
+              <a:gd name="connsiteX17" fmla="*/ 1689463 w 3997234"/>
+              <a:gd name="connsiteY17" fmla="*/ 83319 h 371320"/>
+              <a:gd name="connsiteX18" fmla="*/ 1715589 w 3997234"/>
+              <a:gd name="connsiteY18" fmla="*/ 74611 h 371320"/>
+              <a:gd name="connsiteX19" fmla="*/ 1759132 w 3997234"/>
+              <a:gd name="connsiteY19" fmla="*/ 65902 h 371320"/>
+              <a:gd name="connsiteX20" fmla="*/ 1802674 w 3997234"/>
+              <a:gd name="connsiteY20" fmla="*/ 48485 h 371320"/>
+              <a:gd name="connsiteX21" fmla="*/ 1915886 w 3997234"/>
+              <a:gd name="connsiteY21" fmla="*/ 31068 h 371320"/>
+              <a:gd name="connsiteX22" fmla="*/ 2882537 w 3997234"/>
+              <a:gd name="connsiteY22" fmla="*/ 4942 h 371320"/>
+              <a:gd name="connsiteX23" fmla="*/ 3030583 w 3997234"/>
+              <a:gd name="connsiteY23" fmla="*/ 22359 h 371320"/>
+              <a:gd name="connsiteX24" fmla="*/ 3082834 w 3997234"/>
+              <a:gd name="connsiteY24" fmla="*/ 39777 h 371320"/>
+              <a:gd name="connsiteX25" fmla="*/ 3100252 w 3997234"/>
+              <a:gd name="connsiteY25" fmla="*/ 65902 h 371320"/>
+              <a:gd name="connsiteX26" fmla="*/ 3126377 w 3997234"/>
+              <a:gd name="connsiteY26" fmla="*/ 100737 h 371320"/>
+              <a:gd name="connsiteX27" fmla="*/ 3161212 w 3997234"/>
+              <a:gd name="connsiteY27" fmla="*/ 170405 h 371320"/>
+              <a:gd name="connsiteX28" fmla="*/ 3187337 w 3997234"/>
+              <a:gd name="connsiteY28" fmla="*/ 222657 h 371320"/>
+              <a:gd name="connsiteX29" fmla="*/ 3257006 w 3997234"/>
+              <a:gd name="connsiteY29" fmla="*/ 266199 h 371320"/>
+              <a:gd name="connsiteX30" fmla="*/ 3283132 w 3997234"/>
+              <a:gd name="connsiteY30" fmla="*/ 283617 h 371320"/>
+              <a:gd name="connsiteX31" fmla="*/ 3326674 w 3997234"/>
+              <a:gd name="connsiteY31" fmla="*/ 309742 h 371320"/>
+              <a:gd name="connsiteX32" fmla="*/ 3387634 w 3997234"/>
+              <a:gd name="connsiteY32" fmla="*/ 353285 h 371320"/>
+              <a:gd name="connsiteX33" fmla="*/ 3413760 w 3997234"/>
+              <a:gd name="connsiteY33" fmla="*/ 370702 h 371320"/>
+              <a:gd name="connsiteX34" fmla="*/ 3657600 w 3997234"/>
+              <a:gd name="connsiteY34" fmla="*/ 361994 h 371320"/>
+              <a:gd name="connsiteX35" fmla="*/ 3692434 w 3997234"/>
+              <a:gd name="connsiteY35" fmla="*/ 353285 h 371320"/>
+              <a:gd name="connsiteX36" fmla="*/ 3753394 w 3997234"/>
+              <a:gd name="connsiteY36" fmla="*/ 344577 h 371320"/>
+              <a:gd name="connsiteX37" fmla="*/ 3997234 w 3997234"/>
+              <a:gd name="connsiteY37" fmla="*/ 335868 h 371320"/>
             </a:gdLst>
             <a:ahLst/>
             <a:cxnLst>
@@ -18950,98 +19287,699 @@
               <a:cxn ang="0">
                 <a:pos x="connsiteX15" y="connsiteY15"/>
               </a:cxn>
+              <a:cxn ang="0">
+                <a:pos x="connsiteX16" y="connsiteY16"/>
+              </a:cxn>
+              <a:cxn ang="0">
+                <a:pos x="connsiteX17" y="connsiteY17"/>
+              </a:cxn>
+              <a:cxn ang="0">
+                <a:pos x="connsiteX18" y="connsiteY18"/>
+              </a:cxn>
+              <a:cxn ang="0">
+                <a:pos x="connsiteX19" y="connsiteY19"/>
+              </a:cxn>
+              <a:cxn ang="0">
+                <a:pos x="connsiteX20" y="connsiteY20"/>
+              </a:cxn>
+              <a:cxn ang="0">
+                <a:pos x="connsiteX21" y="connsiteY21"/>
+              </a:cxn>
+              <a:cxn ang="0">
+                <a:pos x="connsiteX22" y="connsiteY22"/>
+              </a:cxn>
+              <a:cxn ang="0">
+                <a:pos x="connsiteX23" y="connsiteY23"/>
+              </a:cxn>
+              <a:cxn ang="0">
+                <a:pos x="connsiteX24" y="connsiteY24"/>
+              </a:cxn>
+              <a:cxn ang="0">
+                <a:pos x="connsiteX25" y="connsiteY25"/>
+              </a:cxn>
+              <a:cxn ang="0">
+                <a:pos x="connsiteX26" y="connsiteY26"/>
+              </a:cxn>
+              <a:cxn ang="0">
+                <a:pos x="connsiteX27" y="connsiteY27"/>
+              </a:cxn>
+              <a:cxn ang="0">
+                <a:pos x="connsiteX28" y="connsiteY28"/>
+              </a:cxn>
+              <a:cxn ang="0">
+                <a:pos x="connsiteX29" y="connsiteY29"/>
+              </a:cxn>
+              <a:cxn ang="0">
+                <a:pos x="connsiteX30" y="connsiteY30"/>
+              </a:cxn>
+              <a:cxn ang="0">
+                <a:pos x="connsiteX31" y="connsiteY31"/>
+              </a:cxn>
+              <a:cxn ang="0">
+                <a:pos x="connsiteX32" y="connsiteY32"/>
+              </a:cxn>
+              <a:cxn ang="0">
+                <a:pos x="connsiteX33" y="connsiteY33"/>
+              </a:cxn>
+              <a:cxn ang="0">
+                <a:pos x="connsiteX34" y="connsiteY34"/>
+              </a:cxn>
+              <a:cxn ang="0">
+                <a:pos x="connsiteX35" y="connsiteY35"/>
+              </a:cxn>
+              <a:cxn ang="0">
+                <a:pos x="connsiteX36" y="connsiteY36"/>
+              </a:cxn>
+              <a:cxn ang="0">
+                <a:pos x="connsiteX37" y="connsiteY37"/>
+              </a:cxn>
             </a:cxnLst>
             <a:rect l="l" t="t" r="r" b="b"/>
             <a:pathLst>
-              <a:path w="2517059" h="541483">
+              <a:path w="3997234" h="371320">
                 <a:moveTo>
-                  <a:pt x="0" y="63521"/>
+                  <a:pt x="0" y="292325"/>
                 </a:moveTo>
                 <a:cubicBezTo>
-                  <a:pt x="50800" y="98753"/>
-                  <a:pt x="101600" y="133985"/>
-                  <a:pt x="147484" y="161843"/>
-                </a:cubicBezTo>
-                <a:cubicBezTo>
-                  <a:pt x="193368" y="189701"/>
-                  <a:pt x="226143" y="222475"/>
-                  <a:pt x="275304" y="230669"/>
-                </a:cubicBezTo>
-                <a:cubicBezTo>
-                  <a:pt x="324465" y="238863"/>
-                  <a:pt x="380181" y="168399"/>
-                  <a:pt x="442452" y="211005"/>
-                </a:cubicBezTo>
-                <a:cubicBezTo>
-                  <a:pt x="504723" y="253611"/>
-                  <a:pt x="576827" y="435508"/>
-                  <a:pt x="648930" y="486308"/>
-                </a:cubicBezTo>
-                <a:cubicBezTo>
-                  <a:pt x="721033" y="537108"/>
-                  <a:pt x="825910" y="564966"/>
-                  <a:pt x="875071" y="515805"/>
-                </a:cubicBezTo>
-                <a:cubicBezTo>
-                  <a:pt x="924232" y="466644"/>
-                  <a:pt x="916039" y="225753"/>
-                  <a:pt x="943897" y="191340"/>
-                </a:cubicBezTo>
-                <a:cubicBezTo>
-                  <a:pt x="971755" y="156927"/>
-                  <a:pt x="1019278" y="340462"/>
-                  <a:pt x="1042220" y="309327"/>
-                </a:cubicBezTo>
-                <a:cubicBezTo>
-                  <a:pt x="1065162" y="278192"/>
-                  <a:pt x="1063523" y="35662"/>
-                  <a:pt x="1081549" y="4527"/>
-                </a:cubicBezTo>
-                <a:cubicBezTo>
-                  <a:pt x="1099575" y="-26609"/>
-                  <a:pt x="1120878" y="112682"/>
-                  <a:pt x="1150375" y="122514"/>
-                </a:cubicBezTo>
-                <a:cubicBezTo>
-                  <a:pt x="1179872" y="132346"/>
-                  <a:pt x="1189704" y="25831"/>
-                  <a:pt x="1258530" y="63521"/>
-                </a:cubicBezTo>
-                <a:cubicBezTo>
-                  <a:pt x="1327356" y="101211"/>
-                  <a:pt x="1458453" y="353572"/>
-                  <a:pt x="1563330" y="348656"/>
-                </a:cubicBezTo>
-                <a:cubicBezTo>
-                  <a:pt x="1668207" y="343740"/>
-                  <a:pt x="1779639" y="73353"/>
-                  <a:pt x="1887794" y="34024"/>
-                </a:cubicBezTo>
-                <a:cubicBezTo>
-                  <a:pt x="1995949" y="-5305"/>
-                  <a:pt x="2133601" y="111043"/>
-                  <a:pt x="2212259" y="112682"/>
-                </a:cubicBezTo>
-                <a:cubicBezTo>
-                  <a:pt x="2290917" y="114321"/>
-                  <a:pt x="2308942" y="45495"/>
-                  <a:pt x="2359742" y="43856"/>
-                </a:cubicBezTo>
-                <a:cubicBezTo>
-                  <a:pt x="2410542" y="42217"/>
-                  <a:pt x="2463800" y="72533"/>
-                  <a:pt x="2517059" y="102850"/>
+                  <a:pt x="118174" y="282478"/>
+                  <a:pt x="95688" y="278767"/>
+                  <a:pt x="217714" y="292325"/>
+                </a:cubicBezTo>
+                <a:cubicBezTo>
+                  <a:pt x="262141" y="297261"/>
+                  <a:pt x="255673" y="302393"/>
+                  <a:pt x="296092" y="309742"/>
+                </a:cubicBezTo>
+                <a:cubicBezTo>
+                  <a:pt x="316287" y="313414"/>
+                  <a:pt x="336732" y="315548"/>
+                  <a:pt x="357052" y="318451"/>
+                </a:cubicBezTo>
+                <a:cubicBezTo>
+                  <a:pt x="365760" y="321354"/>
+                  <a:pt x="374137" y="325564"/>
+                  <a:pt x="383177" y="327159"/>
+                </a:cubicBezTo>
+                <a:cubicBezTo>
+                  <a:pt x="423605" y="334293"/>
+                  <a:pt x="505097" y="344577"/>
+                  <a:pt x="505097" y="344577"/>
+                </a:cubicBezTo>
+                <a:cubicBezTo>
+                  <a:pt x="612149" y="380258"/>
+                  <a:pt x="538540" y="359088"/>
+                  <a:pt x="792480" y="344577"/>
+                </a:cubicBezTo>
+                <a:cubicBezTo>
+                  <a:pt x="807258" y="343733"/>
+                  <a:pt x="821402" y="338177"/>
+                  <a:pt x="836023" y="335868"/>
+                </a:cubicBezTo>
+                <a:cubicBezTo>
+                  <a:pt x="876573" y="329465"/>
+                  <a:pt x="916913" y="319819"/>
+                  <a:pt x="957943" y="318451"/>
+                </a:cubicBezTo>
+                <a:lnTo>
+                  <a:pt x="1219200" y="309742"/>
+                </a:lnTo>
+                <a:cubicBezTo>
+                  <a:pt x="1236617" y="306839"/>
+                  <a:pt x="1253972" y="303531"/>
+                  <a:pt x="1271452" y="301034"/>
+                </a:cubicBezTo>
+                <a:cubicBezTo>
+                  <a:pt x="1294620" y="297724"/>
+                  <a:pt x="1318236" y="297229"/>
+                  <a:pt x="1341120" y="292325"/>
+                </a:cubicBezTo>
+                <a:cubicBezTo>
+                  <a:pt x="1359072" y="288478"/>
+                  <a:pt x="1375955" y="280714"/>
+                  <a:pt x="1393372" y="274908"/>
+                </a:cubicBezTo>
+                <a:cubicBezTo>
+                  <a:pt x="1419498" y="254588"/>
+                  <a:pt x="1451073" y="239793"/>
+                  <a:pt x="1471749" y="213948"/>
+                </a:cubicBezTo>
+                <a:cubicBezTo>
+                  <a:pt x="1506297" y="170763"/>
+                  <a:pt x="1506166" y="161904"/>
+                  <a:pt x="1558834" y="135571"/>
+                </a:cubicBezTo>
+                <a:cubicBezTo>
+                  <a:pt x="1674370" y="77805"/>
+                  <a:pt x="1530096" y="147887"/>
+                  <a:pt x="1619794" y="109445"/>
+                </a:cubicBezTo>
+                <a:cubicBezTo>
+                  <a:pt x="1631726" y="104331"/>
+                  <a:pt x="1642473" y="96586"/>
+                  <a:pt x="1654629" y="92028"/>
+                </a:cubicBezTo>
+                <a:cubicBezTo>
+                  <a:pt x="1665836" y="87825"/>
+                  <a:pt x="1677955" y="86607"/>
+                  <a:pt x="1689463" y="83319"/>
+                </a:cubicBezTo>
+                <a:cubicBezTo>
+                  <a:pt x="1698289" y="80797"/>
+                  <a:pt x="1706683" y="76837"/>
+                  <a:pt x="1715589" y="74611"/>
+                </a:cubicBezTo>
+                <a:cubicBezTo>
+                  <a:pt x="1729949" y="71021"/>
+                  <a:pt x="1744954" y="70155"/>
+                  <a:pt x="1759132" y="65902"/>
+                </a:cubicBezTo>
+                <a:cubicBezTo>
+                  <a:pt x="1774105" y="61410"/>
+                  <a:pt x="1787701" y="52977"/>
+                  <a:pt x="1802674" y="48485"/>
+                </a:cubicBezTo>
+                <a:cubicBezTo>
+                  <a:pt x="1832231" y="39618"/>
+                  <a:pt x="1889930" y="34607"/>
+                  <a:pt x="1915886" y="31068"/>
+                </a:cubicBezTo>
+                <a:cubicBezTo>
+                  <a:pt x="2337201" y="-26385"/>
+                  <a:pt x="1855228" y="15533"/>
+                  <a:pt x="2882537" y="4942"/>
+                </a:cubicBezTo>
+                <a:cubicBezTo>
+                  <a:pt x="2956946" y="10666"/>
+                  <a:pt x="2975074" y="5706"/>
+                  <a:pt x="3030583" y="22359"/>
+                </a:cubicBezTo>
+                <a:cubicBezTo>
+                  <a:pt x="3048168" y="27635"/>
+                  <a:pt x="3082834" y="39777"/>
+                  <a:pt x="3082834" y="39777"/>
+                </a:cubicBezTo>
+                <a:cubicBezTo>
+                  <a:pt x="3088640" y="48485"/>
+                  <a:pt x="3094169" y="57385"/>
+                  <a:pt x="3100252" y="65902"/>
+                </a:cubicBezTo>
+                <a:cubicBezTo>
+                  <a:pt x="3108688" y="77713"/>
+                  <a:pt x="3119886" y="87755"/>
+                  <a:pt x="3126377" y="100737"/>
+                </a:cubicBezTo>
+                <a:cubicBezTo>
+                  <a:pt x="3166401" y="180787"/>
+                  <a:pt x="3121863" y="131058"/>
+                  <a:pt x="3161212" y="170405"/>
+                </a:cubicBezTo>
+                <a:cubicBezTo>
+                  <a:pt x="3168294" y="191654"/>
+                  <a:pt x="3170455" y="205775"/>
+                  <a:pt x="3187337" y="222657"/>
+                </a:cubicBezTo>
+                <a:cubicBezTo>
+                  <a:pt x="3215087" y="250407"/>
+                  <a:pt x="3224816" y="247804"/>
+                  <a:pt x="3257006" y="266199"/>
+                </a:cubicBezTo>
+                <a:cubicBezTo>
+                  <a:pt x="3266094" y="271392"/>
+                  <a:pt x="3274256" y="278070"/>
+                  <a:pt x="3283132" y="283617"/>
+                </a:cubicBezTo>
+                <a:cubicBezTo>
+                  <a:pt x="3297485" y="292588"/>
+                  <a:pt x="3313313" y="299350"/>
+                  <a:pt x="3326674" y="309742"/>
+                </a:cubicBezTo>
+                <a:cubicBezTo>
+                  <a:pt x="3388662" y="357955"/>
+                  <a:pt x="3334380" y="335534"/>
+                  <a:pt x="3387634" y="353285"/>
+                </a:cubicBezTo>
+                <a:cubicBezTo>
+                  <a:pt x="3396343" y="359091"/>
+                  <a:pt x="3403299" y="370365"/>
+                  <a:pt x="3413760" y="370702"/>
+                </a:cubicBezTo>
+                <a:cubicBezTo>
+                  <a:pt x="3495050" y="373324"/>
+                  <a:pt x="3576427" y="367067"/>
+                  <a:pt x="3657600" y="361994"/>
+                </a:cubicBezTo>
+                <a:cubicBezTo>
+                  <a:pt x="3669545" y="361247"/>
+                  <a:pt x="3680658" y="355426"/>
+                  <a:pt x="3692434" y="353285"/>
+                </a:cubicBezTo>
+                <a:cubicBezTo>
+                  <a:pt x="3712629" y="349613"/>
+                  <a:pt x="3733074" y="347480"/>
+                  <a:pt x="3753394" y="344577"/>
+                </a:cubicBezTo>
+                <a:cubicBezTo>
+                  <a:pt x="3848367" y="312918"/>
+                  <a:pt x="3770340" y="335868"/>
+                  <a:pt x="3997234" y="335868"/>
                 </a:cubicBezTo>
               </a:path>
             </a:pathLst>
           </a:custGeom>
           <a:noFill/>
-          <a:ln w="19050">
-            <a:solidFill>
-              <a:schemeClr val="tx2"/>
-            </a:solidFill>
-            <a:prstDash val="sysDash"/>
-          </a:ln>
+        </p:spPr>
+        <p:style>
+          <a:lnRef idx="2">
+            <a:schemeClr val="accent1">
+              <a:shade val="50000"/>
+            </a:schemeClr>
+          </a:lnRef>
+          <a:fillRef idx="1">
+            <a:schemeClr val="accent1"/>
+          </a:fillRef>
+          <a:effectRef idx="0">
+            <a:schemeClr val="accent1"/>
+          </a:effectRef>
+          <a:fontRef idx="minor">
+            <a:schemeClr val="lt1"/>
+          </a:fontRef>
+        </p:style>
+        <p:txBody>
+          <a:bodyPr rtlCol="0" anchor="ctr"/>
+          <a:lstStyle/>
+          <a:p>
+            <a:pPr algn="ctr"/>
+            <a:endParaRPr lang="en-US"/>
+          </a:p>
+        </p:txBody>
+      </p:sp>
+      <p:sp>
+        <p:nvSpPr>
+          <p:cNvPr id="11" name="Freeform: Shape 10">
+            <a:extLst>
+              <a:ext uri="{FF2B5EF4-FFF2-40B4-BE49-F238E27FC236}">
+                <a16:creationId xmlns:a16="http://schemas.microsoft.com/office/drawing/2014/main" id="{DEAD8C3E-576E-4AFC-BC94-96471C9CB809}"/>
+              </a:ext>
+            </a:extLst>
+          </p:cNvPr>
+          <p:cNvSpPr/>
+          <p:nvPr/>
+        </p:nvSpPr>
+        <p:spPr>
+          <a:xfrm>
+            <a:off x="4641668" y="2819749"/>
+            <a:ext cx="3997234" cy="371320"/>
+          </a:xfrm>
+          <a:custGeom>
+            <a:avLst/>
+            <a:gdLst>
+              <a:gd name="connsiteX0" fmla="*/ 0 w 3997234"/>
+              <a:gd name="connsiteY0" fmla="*/ 292325 h 371320"/>
+              <a:gd name="connsiteX1" fmla="*/ 217714 w 3997234"/>
+              <a:gd name="connsiteY1" fmla="*/ 292325 h 371320"/>
+              <a:gd name="connsiteX2" fmla="*/ 296092 w 3997234"/>
+              <a:gd name="connsiteY2" fmla="*/ 309742 h 371320"/>
+              <a:gd name="connsiteX3" fmla="*/ 357052 w 3997234"/>
+              <a:gd name="connsiteY3" fmla="*/ 318451 h 371320"/>
+              <a:gd name="connsiteX4" fmla="*/ 383177 w 3997234"/>
+              <a:gd name="connsiteY4" fmla="*/ 327159 h 371320"/>
+              <a:gd name="connsiteX5" fmla="*/ 505097 w 3997234"/>
+              <a:gd name="connsiteY5" fmla="*/ 344577 h 371320"/>
+              <a:gd name="connsiteX6" fmla="*/ 792480 w 3997234"/>
+              <a:gd name="connsiteY6" fmla="*/ 344577 h 371320"/>
+              <a:gd name="connsiteX7" fmla="*/ 836023 w 3997234"/>
+              <a:gd name="connsiteY7" fmla="*/ 335868 h 371320"/>
+              <a:gd name="connsiteX8" fmla="*/ 957943 w 3997234"/>
+              <a:gd name="connsiteY8" fmla="*/ 318451 h 371320"/>
+              <a:gd name="connsiteX9" fmla="*/ 1219200 w 3997234"/>
+              <a:gd name="connsiteY9" fmla="*/ 309742 h 371320"/>
+              <a:gd name="connsiteX10" fmla="*/ 1271452 w 3997234"/>
+              <a:gd name="connsiteY10" fmla="*/ 301034 h 371320"/>
+              <a:gd name="connsiteX11" fmla="*/ 1341120 w 3997234"/>
+              <a:gd name="connsiteY11" fmla="*/ 292325 h 371320"/>
+              <a:gd name="connsiteX12" fmla="*/ 1393372 w 3997234"/>
+              <a:gd name="connsiteY12" fmla="*/ 274908 h 371320"/>
+              <a:gd name="connsiteX13" fmla="*/ 1471749 w 3997234"/>
+              <a:gd name="connsiteY13" fmla="*/ 213948 h 371320"/>
+              <a:gd name="connsiteX14" fmla="*/ 1558834 w 3997234"/>
+              <a:gd name="connsiteY14" fmla="*/ 135571 h 371320"/>
+              <a:gd name="connsiteX15" fmla="*/ 1619794 w 3997234"/>
+              <a:gd name="connsiteY15" fmla="*/ 109445 h 371320"/>
+              <a:gd name="connsiteX16" fmla="*/ 1654629 w 3997234"/>
+              <a:gd name="connsiteY16" fmla="*/ 92028 h 371320"/>
+              <a:gd name="connsiteX17" fmla="*/ 1689463 w 3997234"/>
+              <a:gd name="connsiteY17" fmla="*/ 83319 h 371320"/>
+              <a:gd name="connsiteX18" fmla="*/ 1715589 w 3997234"/>
+              <a:gd name="connsiteY18" fmla="*/ 74611 h 371320"/>
+              <a:gd name="connsiteX19" fmla="*/ 1759132 w 3997234"/>
+              <a:gd name="connsiteY19" fmla="*/ 65902 h 371320"/>
+              <a:gd name="connsiteX20" fmla="*/ 1802674 w 3997234"/>
+              <a:gd name="connsiteY20" fmla="*/ 48485 h 371320"/>
+              <a:gd name="connsiteX21" fmla="*/ 1915886 w 3997234"/>
+              <a:gd name="connsiteY21" fmla="*/ 31068 h 371320"/>
+              <a:gd name="connsiteX22" fmla="*/ 2882537 w 3997234"/>
+              <a:gd name="connsiteY22" fmla="*/ 4942 h 371320"/>
+              <a:gd name="connsiteX23" fmla="*/ 3030583 w 3997234"/>
+              <a:gd name="connsiteY23" fmla="*/ 22359 h 371320"/>
+              <a:gd name="connsiteX24" fmla="*/ 3082834 w 3997234"/>
+              <a:gd name="connsiteY24" fmla="*/ 39777 h 371320"/>
+              <a:gd name="connsiteX25" fmla="*/ 3100252 w 3997234"/>
+              <a:gd name="connsiteY25" fmla="*/ 65902 h 371320"/>
+              <a:gd name="connsiteX26" fmla="*/ 3126377 w 3997234"/>
+              <a:gd name="connsiteY26" fmla="*/ 100737 h 371320"/>
+              <a:gd name="connsiteX27" fmla="*/ 3161212 w 3997234"/>
+              <a:gd name="connsiteY27" fmla="*/ 170405 h 371320"/>
+              <a:gd name="connsiteX28" fmla="*/ 3187337 w 3997234"/>
+              <a:gd name="connsiteY28" fmla="*/ 222657 h 371320"/>
+              <a:gd name="connsiteX29" fmla="*/ 3257006 w 3997234"/>
+              <a:gd name="connsiteY29" fmla="*/ 266199 h 371320"/>
+              <a:gd name="connsiteX30" fmla="*/ 3283132 w 3997234"/>
+              <a:gd name="connsiteY30" fmla="*/ 283617 h 371320"/>
+              <a:gd name="connsiteX31" fmla="*/ 3326674 w 3997234"/>
+              <a:gd name="connsiteY31" fmla="*/ 309742 h 371320"/>
+              <a:gd name="connsiteX32" fmla="*/ 3387634 w 3997234"/>
+              <a:gd name="connsiteY32" fmla="*/ 353285 h 371320"/>
+              <a:gd name="connsiteX33" fmla="*/ 3413760 w 3997234"/>
+              <a:gd name="connsiteY33" fmla="*/ 370702 h 371320"/>
+              <a:gd name="connsiteX34" fmla="*/ 3657600 w 3997234"/>
+              <a:gd name="connsiteY34" fmla="*/ 361994 h 371320"/>
+              <a:gd name="connsiteX35" fmla="*/ 3692434 w 3997234"/>
+              <a:gd name="connsiteY35" fmla="*/ 353285 h 371320"/>
+              <a:gd name="connsiteX36" fmla="*/ 3753394 w 3997234"/>
+              <a:gd name="connsiteY36" fmla="*/ 344577 h 371320"/>
+              <a:gd name="connsiteX37" fmla="*/ 3997234 w 3997234"/>
+              <a:gd name="connsiteY37" fmla="*/ 335868 h 371320"/>
+            </a:gdLst>
+            <a:ahLst/>
+            <a:cxnLst>
+              <a:cxn ang="0">
+                <a:pos x="connsiteX0" y="connsiteY0"/>
+              </a:cxn>
+              <a:cxn ang="0">
+                <a:pos x="connsiteX1" y="connsiteY1"/>
+              </a:cxn>
+              <a:cxn ang="0">
+                <a:pos x="connsiteX2" y="connsiteY2"/>
+              </a:cxn>
+              <a:cxn ang="0">
+                <a:pos x="connsiteX3" y="connsiteY3"/>
+              </a:cxn>
+              <a:cxn ang="0">
+                <a:pos x="connsiteX4" y="connsiteY4"/>
+              </a:cxn>
+              <a:cxn ang="0">
+                <a:pos x="connsiteX5" y="connsiteY5"/>
+              </a:cxn>
+              <a:cxn ang="0">
+                <a:pos x="connsiteX6" y="connsiteY6"/>
+              </a:cxn>
+              <a:cxn ang="0">
+                <a:pos x="connsiteX7" y="connsiteY7"/>
+              </a:cxn>
+              <a:cxn ang="0">
+                <a:pos x="connsiteX8" y="connsiteY8"/>
+              </a:cxn>
+              <a:cxn ang="0">
+                <a:pos x="connsiteX9" y="connsiteY9"/>
+              </a:cxn>
+              <a:cxn ang="0">
+                <a:pos x="connsiteX10" y="connsiteY10"/>
+              </a:cxn>
+              <a:cxn ang="0">
+                <a:pos x="connsiteX11" y="connsiteY11"/>
+              </a:cxn>
+              <a:cxn ang="0">
+                <a:pos x="connsiteX12" y="connsiteY12"/>
+              </a:cxn>
+              <a:cxn ang="0">
+                <a:pos x="connsiteX13" y="connsiteY13"/>
+              </a:cxn>
+              <a:cxn ang="0">
+                <a:pos x="connsiteX14" y="connsiteY14"/>
+              </a:cxn>
+              <a:cxn ang="0">
+                <a:pos x="connsiteX15" y="connsiteY15"/>
+              </a:cxn>
+              <a:cxn ang="0">
+                <a:pos x="connsiteX16" y="connsiteY16"/>
+              </a:cxn>
+              <a:cxn ang="0">
+                <a:pos x="connsiteX17" y="connsiteY17"/>
+              </a:cxn>
+              <a:cxn ang="0">
+                <a:pos x="connsiteX18" y="connsiteY18"/>
+              </a:cxn>
+              <a:cxn ang="0">
+                <a:pos x="connsiteX19" y="connsiteY19"/>
+              </a:cxn>
+              <a:cxn ang="0">
+                <a:pos x="connsiteX20" y="connsiteY20"/>
+              </a:cxn>
+              <a:cxn ang="0">
+                <a:pos x="connsiteX21" y="connsiteY21"/>
+              </a:cxn>
+              <a:cxn ang="0">
+                <a:pos x="connsiteX22" y="connsiteY22"/>
+              </a:cxn>
+              <a:cxn ang="0">
+                <a:pos x="connsiteX23" y="connsiteY23"/>
+              </a:cxn>
+              <a:cxn ang="0">
+                <a:pos x="connsiteX24" y="connsiteY24"/>
+              </a:cxn>
+              <a:cxn ang="0">
+                <a:pos x="connsiteX25" y="connsiteY25"/>
+              </a:cxn>
+              <a:cxn ang="0">
+                <a:pos x="connsiteX26" y="connsiteY26"/>
+              </a:cxn>
+              <a:cxn ang="0">
+                <a:pos x="connsiteX27" y="connsiteY27"/>
+              </a:cxn>
+              <a:cxn ang="0">
+                <a:pos x="connsiteX28" y="connsiteY28"/>
+              </a:cxn>
+              <a:cxn ang="0">
+                <a:pos x="connsiteX29" y="connsiteY29"/>
+              </a:cxn>
+              <a:cxn ang="0">
+                <a:pos x="connsiteX30" y="connsiteY30"/>
+              </a:cxn>
+              <a:cxn ang="0">
+                <a:pos x="connsiteX31" y="connsiteY31"/>
+              </a:cxn>
+              <a:cxn ang="0">
+                <a:pos x="connsiteX32" y="connsiteY32"/>
+              </a:cxn>
+              <a:cxn ang="0">
+                <a:pos x="connsiteX33" y="connsiteY33"/>
+              </a:cxn>
+              <a:cxn ang="0">
+                <a:pos x="connsiteX34" y="connsiteY34"/>
+              </a:cxn>
+              <a:cxn ang="0">
+                <a:pos x="connsiteX35" y="connsiteY35"/>
+              </a:cxn>
+              <a:cxn ang="0">
+                <a:pos x="connsiteX36" y="connsiteY36"/>
+              </a:cxn>
+              <a:cxn ang="0">
+                <a:pos x="connsiteX37" y="connsiteY37"/>
+              </a:cxn>
+            </a:cxnLst>
+            <a:rect l="l" t="t" r="r" b="b"/>
+            <a:pathLst>
+              <a:path w="3997234" h="371320">
+                <a:moveTo>
+                  <a:pt x="0" y="292325"/>
+                </a:moveTo>
+                <a:cubicBezTo>
+                  <a:pt x="118174" y="282478"/>
+                  <a:pt x="95688" y="278767"/>
+                  <a:pt x="217714" y="292325"/>
+                </a:cubicBezTo>
+                <a:cubicBezTo>
+                  <a:pt x="262141" y="297261"/>
+                  <a:pt x="255673" y="302393"/>
+                  <a:pt x="296092" y="309742"/>
+                </a:cubicBezTo>
+                <a:cubicBezTo>
+                  <a:pt x="316287" y="313414"/>
+                  <a:pt x="336732" y="315548"/>
+                  <a:pt x="357052" y="318451"/>
+                </a:cubicBezTo>
+                <a:cubicBezTo>
+                  <a:pt x="365760" y="321354"/>
+                  <a:pt x="374137" y="325564"/>
+                  <a:pt x="383177" y="327159"/>
+                </a:cubicBezTo>
+                <a:cubicBezTo>
+                  <a:pt x="423605" y="334293"/>
+                  <a:pt x="505097" y="344577"/>
+                  <a:pt x="505097" y="344577"/>
+                </a:cubicBezTo>
+                <a:cubicBezTo>
+                  <a:pt x="612149" y="380258"/>
+                  <a:pt x="538540" y="359088"/>
+                  <a:pt x="792480" y="344577"/>
+                </a:cubicBezTo>
+                <a:cubicBezTo>
+                  <a:pt x="807258" y="343733"/>
+                  <a:pt x="821402" y="338177"/>
+                  <a:pt x="836023" y="335868"/>
+                </a:cubicBezTo>
+                <a:cubicBezTo>
+                  <a:pt x="876573" y="329465"/>
+                  <a:pt x="916913" y="319819"/>
+                  <a:pt x="957943" y="318451"/>
+                </a:cubicBezTo>
+                <a:lnTo>
+                  <a:pt x="1219200" y="309742"/>
+                </a:lnTo>
+                <a:cubicBezTo>
+                  <a:pt x="1236617" y="306839"/>
+                  <a:pt x="1253972" y="303531"/>
+                  <a:pt x="1271452" y="301034"/>
+                </a:cubicBezTo>
+                <a:cubicBezTo>
+                  <a:pt x="1294620" y="297724"/>
+                  <a:pt x="1318236" y="297229"/>
+                  <a:pt x="1341120" y="292325"/>
+                </a:cubicBezTo>
+                <a:cubicBezTo>
+                  <a:pt x="1359072" y="288478"/>
+                  <a:pt x="1375955" y="280714"/>
+                  <a:pt x="1393372" y="274908"/>
+                </a:cubicBezTo>
+                <a:cubicBezTo>
+                  <a:pt x="1419498" y="254588"/>
+                  <a:pt x="1451073" y="239793"/>
+                  <a:pt x="1471749" y="213948"/>
+                </a:cubicBezTo>
+                <a:cubicBezTo>
+                  <a:pt x="1506297" y="170763"/>
+                  <a:pt x="1506166" y="161904"/>
+                  <a:pt x="1558834" y="135571"/>
+                </a:cubicBezTo>
+                <a:cubicBezTo>
+                  <a:pt x="1674370" y="77805"/>
+                  <a:pt x="1530096" y="147887"/>
+                  <a:pt x="1619794" y="109445"/>
+                </a:cubicBezTo>
+                <a:cubicBezTo>
+                  <a:pt x="1631726" y="104331"/>
+                  <a:pt x="1642473" y="96586"/>
+                  <a:pt x="1654629" y="92028"/>
+                </a:cubicBezTo>
+                <a:cubicBezTo>
+                  <a:pt x="1665836" y="87825"/>
+                  <a:pt x="1677955" y="86607"/>
+                  <a:pt x="1689463" y="83319"/>
+                </a:cubicBezTo>
+                <a:cubicBezTo>
+                  <a:pt x="1698289" y="80797"/>
+                  <a:pt x="1706683" y="76837"/>
+                  <a:pt x="1715589" y="74611"/>
+                </a:cubicBezTo>
+                <a:cubicBezTo>
+                  <a:pt x="1729949" y="71021"/>
+                  <a:pt x="1744954" y="70155"/>
+                  <a:pt x="1759132" y="65902"/>
+                </a:cubicBezTo>
+                <a:cubicBezTo>
+                  <a:pt x="1774105" y="61410"/>
+                  <a:pt x="1787701" y="52977"/>
+                  <a:pt x="1802674" y="48485"/>
+                </a:cubicBezTo>
+                <a:cubicBezTo>
+                  <a:pt x="1832231" y="39618"/>
+                  <a:pt x="1889930" y="34607"/>
+                  <a:pt x="1915886" y="31068"/>
+                </a:cubicBezTo>
+                <a:cubicBezTo>
+                  <a:pt x="2337201" y="-26385"/>
+                  <a:pt x="1855228" y="15533"/>
+                  <a:pt x="2882537" y="4942"/>
+                </a:cubicBezTo>
+                <a:cubicBezTo>
+                  <a:pt x="2956946" y="10666"/>
+                  <a:pt x="2975074" y="5706"/>
+                  <a:pt x="3030583" y="22359"/>
+                </a:cubicBezTo>
+                <a:cubicBezTo>
+                  <a:pt x="3048168" y="27635"/>
+                  <a:pt x="3082834" y="39777"/>
+                  <a:pt x="3082834" y="39777"/>
+                </a:cubicBezTo>
+                <a:cubicBezTo>
+                  <a:pt x="3088640" y="48485"/>
+                  <a:pt x="3094169" y="57385"/>
+                  <a:pt x="3100252" y="65902"/>
+                </a:cubicBezTo>
+                <a:cubicBezTo>
+                  <a:pt x="3108688" y="77713"/>
+                  <a:pt x="3119886" y="87755"/>
+                  <a:pt x="3126377" y="100737"/>
+                </a:cubicBezTo>
+                <a:cubicBezTo>
+                  <a:pt x="3166401" y="180787"/>
+                  <a:pt x="3121863" y="131058"/>
+                  <a:pt x="3161212" y="170405"/>
+                </a:cubicBezTo>
+                <a:cubicBezTo>
+                  <a:pt x="3168294" y="191654"/>
+                  <a:pt x="3170455" y="205775"/>
+                  <a:pt x="3187337" y="222657"/>
+                </a:cubicBezTo>
+                <a:cubicBezTo>
+                  <a:pt x="3215087" y="250407"/>
+                  <a:pt x="3224816" y="247804"/>
+                  <a:pt x="3257006" y="266199"/>
+                </a:cubicBezTo>
+                <a:cubicBezTo>
+                  <a:pt x="3266094" y="271392"/>
+                  <a:pt x="3274256" y="278070"/>
+                  <a:pt x="3283132" y="283617"/>
+                </a:cubicBezTo>
+                <a:cubicBezTo>
+                  <a:pt x="3297485" y="292588"/>
+                  <a:pt x="3313313" y="299350"/>
+                  <a:pt x="3326674" y="309742"/>
+                </a:cubicBezTo>
+                <a:cubicBezTo>
+                  <a:pt x="3388662" y="357955"/>
+                  <a:pt x="3334380" y="335534"/>
+                  <a:pt x="3387634" y="353285"/>
+                </a:cubicBezTo>
+                <a:cubicBezTo>
+                  <a:pt x="3396343" y="359091"/>
+                  <a:pt x="3403299" y="370365"/>
+                  <a:pt x="3413760" y="370702"/>
+                </a:cubicBezTo>
+                <a:cubicBezTo>
+                  <a:pt x="3495050" y="373324"/>
+                  <a:pt x="3576427" y="367067"/>
+                  <a:pt x="3657600" y="361994"/>
+                </a:cubicBezTo>
+                <a:cubicBezTo>
+                  <a:pt x="3669545" y="361247"/>
+                  <a:pt x="3680658" y="355426"/>
+                  <a:pt x="3692434" y="353285"/>
+                </a:cubicBezTo>
+                <a:cubicBezTo>
+                  <a:pt x="3712629" y="349613"/>
+                  <a:pt x="3733074" y="347480"/>
+                  <a:pt x="3753394" y="344577"/>
+                </a:cubicBezTo>
+                <a:cubicBezTo>
+                  <a:pt x="3848367" y="312918"/>
+                  <a:pt x="3770340" y="335868"/>
+                  <a:pt x="3997234" y="335868"/>
+                </a:cubicBezTo>
+              </a:path>
+            </a:pathLst>
+          </a:custGeom>
+          <a:noFill/>
         </p:spPr>
         <p:style>
           <a:lnRef idx="2">
@@ -19588,14 +20526,14 @@
         </a:ln>
         <a:extLst>
           <a:ext uri="{909E8E84-426E-40dd-AFC4-6F175D3DCCD1}">
-            <a14:hiddenFill xmlns:r="http://schemas.openxmlformats.org/officeDocument/2006/relationships" xmlns:p="http://schemas.openxmlformats.org/presentationml/2006/main" xmlns:a14="http://schemas.microsoft.com/office/drawing/2010/main" xmlns="">
+            <a14:hiddenFill xmlns="" xmlns:a14="http://schemas.microsoft.com/office/drawing/2010/main" xmlns:p="http://schemas.openxmlformats.org/presentationml/2006/main" xmlns:r="http://schemas.openxmlformats.org/officeDocument/2006/relationships">
               <a:solidFill>
                 <a:srgbClr val="FFFFFF"/>
               </a:solidFill>
             </a14:hiddenFill>
           </a:ext>
           <a:ext uri="{91240B29-F687-4f45-9708-019B960494DF}">
-            <a14:hiddenLine xmlns:r="http://schemas.openxmlformats.org/officeDocument/2006/relationships" xmlns:p="http://schemas.openxmlformats.org/presentationml/2006/main" xmlns:a14="http://schemas.microsoft.com/office/drawing/2010/main" xmlns="" w="9525">
+            <a14:hiddenLine xmlns="" xmlns:a14="http://schemas.microsoft.com/office/drawing/2010/main" xmlns:p="http://schemas.openxmlformats.org/presentationml/2006/main" xmlns:r="http://schemas.openxmlformats.org/officeDocument/2006/relationships" w="9525">
               <a:solidFill>
                 <a:srgbClr val="000000"/>
               </a:solidFill>
@@ -19605,7 +20543,7 @@
             </a14:hiddenLine>
           </a:ext>
           <a:ext uri="{FAA26D3D-D897-4be2-8F04-BA451C77F1D7}">
-            <ma14:placeholderFlag xmlns:r="http://schemas.openxmlformats.org/officeDocument/2006/relationships" xmlns:p="http://schemas.openxmlformats.org/presentationml/2006/main" xmlns:ma14="http://schemas.microsoft.com/office/mac/drawingml/2011/main" xmlns="" val="1"/>
+            <ma14:placeholderFlag xmlns="" xmlns:ma14="http://schemas.microsoft.com/office/mac/drawingml/2011/main" xmlns:p="http://schemas.openxmlformats.org/presentationml/2006/main" xmlns:r="http://schemas.openxmlformats.org/officeDocument/2006/relationships" val="1"/>
           </a:ext>
         </a:extLst>
       </a:spPr>
@@ -19645,6 +20583,21 @@
 </file>
 
 <file path=customXml/item1.xml><?xml version="1.0" encoding="utf-8"?>
+<?mso-contentType ?>
+<FormTemplates xmlns="http://schemas.microsoft.com/sharepoint/v3/contenttype/forms">
+  <Display>DocumentLibraryForm</Display>
+  <Edit>DocumentLibraryForm</Edit>
+  <New>DocumentLibraryForm</New>
+</FormTemplates>
+</file>
+
+<file path=customXml/item2.xml><?xml version="1.0" encoding="utf-8"?>
+<p:properties xmlns:p="http://schemas.microsoft.com/office/2006/metadata/properties" xmlns:xsi="http://www.w3.org/2001/XMLSchema-instance" xmlns:pc="http://schemas.microsoft.com/office/infopath/2007/PartnerControls">
+  <documentManagement/>
+</p:properties>
+</file>
+
+<file path=customXml/item3.xml><?xml version="1.0" encoding="utf-8"?>
 <ct:contentTypeSchema xmlns:ct="http://schemas.microsoft.com/office/2006/metadata/contentType" xmlns:ma="http://schemas.microsoft.com/office/2006/metadata/properties/metaAttributes" ct:_="" ma:_="" ma:contentTypeName="Document" ma:contentTypeID="0x010100CE837EA164BF0D4D9E6B96B30B72F56C" ma:contentTypeVersion="11" ma:contentTypeDescription="Create a new document." ma:contentTypeScope="" ma:versionID="d2379a97b0b1ed532b2c8498ad5cf532">
   <xsd:schema xmlns:xsd="http://www.w3.org/2001/XMLSchema" xmlns:xs="http://www.w3.org/2001/XMLSchema" xmlns:p="http://schemas.microsoft.com/office/2006/metadata/properties" xmlns:ns3="a9307db5-a10f-4591-aeef-fc8a1fa38b1e" xmlns:ns4="fcf4638a-8e7d-4091-9357-53a8b78e0f7b" targetNamespace="http://schemas.microsoft.com/office/2006/metadata/properties" ma:root="true" ma:fieldsID="0e6868277bb03aa0fbd5ada699131d2e" ns3:_="" ns4:_="">
     <xsd:import namespace="a9307db5-a10f-4591-aeef-fc8a1fa38b1e"/>
@@ -19853,36 +20806,10 @@
 </ct:contentTypeSchema>
 </file>
 
-<file path=customXml/item2.xml><?xml version="1.0" encoding="utf-8"?>
-<p:properties xmlns:p="http://schemas.microsoft.com/office/2006/metadata/properties" xmlns:xsi="http://www.w3.org/2001/XMLSchema-instance" xmlns:pc="http://schemas.microsoft.com/office/infopath/2007/PartnerControls">
-  <documentManagement/>
-</p:properties>
-</file>
-
-<file path=customXml/item3.xml><?xml version="1.0" encoding="utf-8"?>
-<?mso-contentType ?>
-<FormTemplates xmlns="http://schemas.microsoft.com/sharepoint/v3/contenttype/forms">
-  <Display>DocumentLibraryForm</Display>
-  <Edit>DocumentLibraryForm</Edit>
-  <New>DocumentLibraryForm</New>
-</FormTemplates>
-</file>
-
 <file path=customXml/itemProps1.xml><?xml version="1.0" encoding="utf-8"?>
-<ds:datastoreItem xmlns:ds="http://schemas.openxmlformats.org/officeDocument/2006/customXml" ds:itemID="{64CEE494-9BFD-4BD0-AFC0-12E4E888C836}">
+<ds:datastoreItem xmlns:ds="http://schemas.openxmlformats.org/officeDocument/2006/customXml" ds:itemID="{3684C3F6-B553-4D03-9805-DC82AC2045DD}">
   <ds:schemaRefs>
-    <ds:schemaRef ds:uri="http://schemas.microsoft.com/office/2006/metadata/contentType"/>
-    <ds:schemaRef ds:uri="http://schemas.microsoft.com/office/2006/metadata/properties/metaAttributes"/>
-    <ds:schemaRef ds:uri="http://www.w3.org/2001/XMLSchema"/>
-    <ds:schemaRef ds:uri="http://schemas.microsoft.com/office/2006/metadata/properties"/>
-    <ds:schemaRef ds:uri="a9307db5-a10f-4591-aeef-fc8a1fa38b1e"/>
-    <ds:schemaRef ds:uri="fcf4638a-8e7d-4091-9357-53a8b78e0f7b"/>
-    <ds:schemaRef ds:uri="http://schemas.microsoft.com/office/2006/documentManagement/types"/>
-    <ds:schemaRef ds:uri="http://schemas.microsoft.com/office/infopath/2007/PartnerControls"/>
-    <ds:schemaRef ds:uri="http://schemas.openxmlformats.org/package/2006/metadata/core-properties"/>
-    <ds:schemaRef ds:uri="http://purl.org/dc/elements/1.1/"/>
-    <ds:schemaRef ds:uri="http://purl.org/dc/terms/"/>
-    <ds:schemaRef ds:uri="http://schemas.microsoft.com/internal/obd"/>
+    <ds:schemaRef ds:uri="http://schemas.microsoft.com/sharepoint/v3/contenttype/forms"/>
   </ds:schemaRefs>
 </ds:datastoreItem>
 </file>
@@ -19905,9 +20832,20 @@
 </file>
 
 <file path=customXml/itemProps3.xml><?xml version="1.0" encoding="utf-8"?>
-<ds:datastoreItem xmlns:ds="http://schemas.openxmlformats.org/officeDocument/2006/customXml" ds:itemID="{3684C3F6-B553-4D03-9805-DC82AC2045DD}">
+<ds:datastoreItem xmlns:ds="http://schemas.openxmlformats.org/officeDocument/2006/customXml" ds:itemID="{64CEE494-9BFD-4BD0-AFC0-12E4E888C836}">
   <ds:schemaRefs>
-    <ds:schemaRef ds:uri="http://schemas.microsoft.com/sharepoint/v3/contenttype/forms"/>
+    <ds:schemaRef ds:uri="http://schemas.microsoft.com/office/2006/metadata/contentType"/>
+    <ds:schemaRef ds:uri="http://schemas.microsoft.com/office/2006/metadata/properties/metaAttributes"/>
+    <ds:schemaRef ds:uri="http://www.w3.org/2001/XMLSchema"/>
+    <ds:schemaRef ds:uri="http://schemas.microsoft.com/office/2006/metadata/properties"/>
+    <ds:schemaRef ds:uri="a9307db5-a10f-4591-aeef-fc8a1fa38b1e"/>
+    <ds:schemaRef ds:uri="fcf4638a-8e7d-4091-9357-53a8b78e0f7b"/>
+    <ds:schemaRef ds:uri="http://schemas.microsoft.com/office/2006/documentManagement/types"/>
+    <ds:schemaRef ds:uri="http://schemas.microsoft.com/office/infopath/2007/PartnerControls"/>
+    <ds:schemaRef ds:uri="http://schemas.openxmlformats.org/package/2006/metadata/core-properties"/>
+    <ds:schemaRef ds:uri="http://purl.org/dc/elements/1.1/"/>
+    <ds:schemaRef ds:uri="http://purl.org/dc/terms/"/>
+    <ds:schemaRef ds:uri="http://schemas.microsoft.com/internal/obd"/>
   </ds:schemaRefs>
 </ds:datastoreItem>
 </file>
</xml_diff>